<commit_message>
Finalização do Projeto Individual
</commit_message>
<xml_diff>
--- a/Projeto Individual.pptx
+++ b/Projeto Individual.pptx
@@ -1,77 +1,56 @@
 
 <file path=ppt/presentation.xml><?xml version="1.0" encoding="utf-8"?>
-<p:presentation xmlns:a="http://schemas.openxmlformats.org/drawingml/2006/main" xmlns:r="http://schemas.openxmlformats.org/officeDocument/2006/relationships" xmlns:p="http://schemas.openxmlformats.org/presentationml/2006/main" saveSubsetFonts="1" embedTrueTypeFonts="true">
+<p:presentation xmlns:a="http://schemas.openxmlformats.org/drawingml/2006/main" xmlns:r="http://schemas.openxmlformats.org/officeDocument/2006/relationships" xmlns:p="http://schemas.openxmlformats.org/presentationml/2006/main" embedTrueTypeFonts="1" saveSubsetFonts="1">
   <p:sldMasterIdLst>
     <p:sldMasterId id="2147483648" r:id="rId1"/>
   </p:sldMasterIdLst>
   <p:sldIdLst>
-    <p:sldId id="256" r:id="rId19"/>
-    <p:sldId id="257" r:id="rId20"/>
-    <p:sldId id="258" r:id="rId21"/>
-    <p:sldId id="259" r:id="rId22"/>
-    <p:sldId id="260" r:id="rId23"/>
-    <p:sldId id="261" r:id="rId24"/>
-    <p:sldId id="262" r:id="rId25"/>
-    <p:sldId id="263" r:id="rId26"/>
-    <p:sldId id="264" r:id="rId27"/>
-    <p:sldId id="265" r:id="rId28"/>
+    <p:sldId id="256" r:id="rId2"/>
+    <p:sldId id="257" r:id="rId3"/>
+    <p:sldId id="258" r:id="rId4"/>
+    <p:sldId id="259" r:id="rId5"/>
+    <p:sldId id="260" r:id="rId6"/>
+    <p:sldId id="261" r:id="rId7"/>
+    <p:sldId id="262" r:id="rId8"/>
+    <p:sldId id="263" r:id="rId9"/>
+    <p:sldId id="264" r:id="rId10"/>
+    <p:sldId id="265" r:id="rId11"/>
   </p:sldIdLst>
   <p:sldSz cx="18288000" cy="10287000"/>
   <p:notesSz cx="6858000" cy="9144000"/>
   <p:embeddedFontLst>
     <p:embeddedFont>
-      <p:font typeface="Arimo" charset="1" panose="020B0604020202020204"/>
-      <p:regular r:id="rId6"/>
-    </p:embeddedFont>
-    <p:embeddedFont>
-      <p:font typeface="Arimo Bold" charset="1" panose="020B0704020202020204"/>
-      <p:regular r:id="rId7"/>
-    </p:embeddedFont>
-    <p:embeddedFont>
-      <p:font typeface="Arimo Italics" charset="1" panose="020B0604020202090204"/>
-      <p:regular r:id="rId8"/>
-    </p:embeddedFont>
-    <p:embeddedFont>
-      <p:font typeface="Arimo Bold Italics" charset="1" panose="020B0704020202090204"/>
-      <p:regular r:id="rId9"/>
-    </p:embeddedFont>
-    <p:embeddedFont>
-      <p:font typeface="Open Sans Light" charset="1" panose="020B0306030504020204"/>
-      <p:regular r:id="rId10"/>
-    </p:embeddedFont>
-    <p:embeddedFont>
-      <p:font typeface="Open Sans Light Bold" charset="1" panose="020B0806030504020204"/>
-      <p:regular r:id="rId11"/>
-    </p:embeddedFont>
-    <p:embeddedFont>
-      <p:font typeface="Open Sans Light Italics" charset="1" panose="020B0306030504020204"/>
+      <p:font typeface="Agrandir" panose="020B0604020202020204" charset="0"/>
       <p:regular r:id="rId12"/>
     </p:embeddedFont>
     <p:embeddedFont>
-      <p:font typeface="Open Sans Light Bold Italics" charset="1" panose="020B0806030504020204"/>
+      <p:font typeface="Agrandir Bold" panose="020B0604020202020204" charset="0"/>
       <p:regular r:id="rId13"/>
     </p:embeddedFont>
     <p:embeddedFont>
-      <p:font typeface="Agrandir" charset="1" panose="00000500000000000000"/>
+      <p:font typeface="Calibri" panose="020F0502020204030204" pitchFamily="34" charset="0"/>
       <p:regular r:id="rId14"/>
+      <p:bold r:id="rId15"/>
+      <p:italic r:id="rId16"/>
+      <p:boldItalic r:id="rId17"/>
     </p:embeddedFont>
     <p:embeddedFont>
-      <p:font typeface="Agrandir Bold" charset="1" panose="00000800000000000000"/>
-      <p:regular r:id="rId15"/>
+      <p:font typeface="Horizon" panose="020B0604020202020204" charset="0"/>
+      <p:regular r:id="rId18"/>
     </p:embeddedFont>
     <p:embeddedFont>
-      <p:font typeface="Agrandir Italics" charset="1" panose="00000500000000000000"/>
-      <p:regular r:id="rId16"/>
-    </p:embeddedFont>
-    <p:embeddedFont>
-      <p:font typeface="Agrandir Bold Italics" charset="1" panose="00000800000000000000"/>
-      <p:regular r:id="rId17"/>
-    </p:embeddedFont>
-    <p:embeddedFont>
-      <p:font typeface="Horizon" charset="1" panose="02000500000000000000"/>
-      <p:regular r:id="rId18"/>
+      <p:font typeface="Open Sans Light" panose="020B0306030504020204" pitchFamily="34" charset="0"/>
+      <p:regular r:id="rId19"/>
+      <p:italic r:id="rId20"/>
     </p:embeddedFont>
   </p:embeddedFontLst>
+  <p:custShowLst>
+    <p:custShow name="Apresentação personalizada 1" id="0">
+      <p:sldLst>
+        <p:sld r:id="rId10"/>
+      </p:sldLst>
+    </p:custShow>
+  </p:custShowLst>
   <p:defaultTextStyle>
     <a:defPPr>
       <a:defRPr lang="en-US"/>
@@ -167,7 +146,358 @@
       </a:defRPr>
     </a:lvl9pPr>
   </p:defaultTextStyle>
+  <p:extLst>
+    <p:ext uri="{EFAFB233-063F-42B5-8137-9DF3F51BA10A}">
+      <p15:sldGuideLst xmlns:p15="http://schemas.microsoft.com/office/powerpoint/2012/main">
+        <p15:guide id="1" orient="horz" pos="2160">
+          <p15:clr>
+            <a:srgbClr val="A4A3A4"/>
+          </p15:clr>
+        </p15:guide>
+        <p15:guide id="2" pos="2880">
+          <p15:clr>
+            <a:srgbClr val="A4A3A4"/>
+          </p15:clr>
+        </p15:guide>
+      </p15:sldGuideLst>
+    </p:ext>
+  </p:extLst>
 </p:presentation>
+</file>
+
+<file path=ppt/ink/ink1.xml><?xml version="1.0" encoding="utf-8"?>
+<inkml:ink xmlns:inkml="http://www.w3.org/2003/InkML">
+  <inkml:definitions>
+    <inkml:context xml:id="ctx0">
+      <inkml:inkSource xml:id="inkSrc0">
+        <inkml:traceFormat>
+          <inkml:channel name="X" type="integer" min="-2.14748E9" max="2.14748E9" units="cm"/>
+          <inkml:channel name="Y" type="integer" min="-2.14748E9" max="2.14748E9" units="cm"/>
+        </inkml:traceFormat>
+        <inkml:channelProperties>
+          <inkml:channelProperty channel="X" name="resolution" value="1000" units="1/cm"/>
+          <inkml:channelProperty channel="Y" name="resolution" value="1000" units="1/cm"/>
+        </inkml:channelProperties>
+      </inkml:inkSource>
+      <inkml:timestamp xml:id="ts0" timeString="2021-06-07T23:01:43.171"/>
+    </inkml:context>
+    <inkml:brush xml:id="br0">
+      <inkml:brushProperty name="width" value="0.1" units="cm"/>
+      <inkml:brushProperty name="height" value="0.6" units="cm"/>
+      <inkml:brushProperty name="color" value="#FFFFFF"/>
+      <inkml:brushProperty name="ignorePressure" value="1"/>
+      <inkml:brushProperty name="inkEffects" value="pencil"/>
+    </inkml:brush>
+  </inkml:definitions>
+  <inkml:trace contextRef="#ctx0" brushRef="#br0">317 303,'0'7,"7"2,8-1,15-1,10-9,3-4,3-1,-1 1,-15 2,-18 0,-19 2,-8 8,-7 2,-15 1,-6 4,-3 1,-7-2,-1-3,1-3,18-3,13-9,19-2,15-8,19-7,11-6,5-5,2 3,-9 0,-17 6,-25 7,-20 6,-19 6,-9 10,-10 4,-7 1,-7-1,4-2,27-2,33-14,26-7,23-6,12-6,3 2,0 6,4 6,-2-2,-3 4,-25 2,-23 11,-19 12,-20 10,-12 8,-10 6,-4 3,3-5,11-8</inkml:trace>
+</inkml:ink>
+</file>
+
+<file path=ppt/ink/ink10.xml><?xml version="1.0" encoding="utf-8"?>
+<inkml:ink xmlns:inkml="http://www.w3.org/2003/InkML">
+  <inkml:definitions>
+    <inkml:context xml:id="ctx0">
+      <inkml:inkSource xml:id="inkSrc0">
+        <inkml:traceFormat>
+          <inkml:channel name="X" type="integer" min="-2.14748E9" max="2.14748E9" units="cm"/>
+          <inkml:channel name="Y" type="integer" min="-2.14748E9" max="2.14748E9" units="cm"/>
+        </inkml:traceFormat>
+        <inkml:channelProperties>
+          <inkml:channelProperty channel="X" name="resolution" value="1000" units="1/cm"/>
+          <inkml:channelProperty channel="Y" name="resolution" value="1000" units="1/cm"/>
+        </inkml:channelProperties>
+      </inkml:inkSource>
+      <inkml:timestamp xml:id="ts0" timeString="2021-06-07T23:03:21.753"/>
+    </inkml:context>
+    <inkml:brush xml:id="br0">
+      <inkml:brushProperty name="width" value="0.05" units="cm"/>
+      <inkml:brushProperty name="height" value="0.05" units="cm"/>
+      <inkml:brushProperty name="color" value="#FFFFFF"/>
+      <inkml:brushProperty name="ignorePressure" value="1"/>
+    </inkml:brush>
+  </inkml:definitions>
+  <inkml:trace contextRef="#ctx0" brushRef="#br0">242 41,'266'1,"278"-3,-536 1,33 1,-1-3,1-1,45-11,-79 12,-8 1,-18-3,-32 1,-497 2,308 3,871-1,-619 0,-1 0,-1 0,0 0,1 1,-1 0,13 4,-23-5,0 0,0 0,1 0,-1 0,0 0,0 0,1 0,-1 0,0 0,0 0,1 0,-1 0,0 0,0 0,0 0,1 0,-1 0,0 0,0 0,0 1,1-1,-1 0,0 0,0 0,0 0,1 0,-1 1,0-1,0 0,0 0,0 0,0 1,0-1,1 0,-1 0,0 0,0 1,0-1,0 0,0 0,0 1,0-1,0 0,0 0,0 0,0 1,0-1,0 0,0 0,0 1,0-1,0 0,0 0,-1 0,1 1,0-1,-18 7,-29 2,-146 16,-308 0,1023-29,-453 1,95-17,-140 13,-51 3,-439-3,252 9,788-1,-1482-1,886-1,9 1,-1 0,1 0,0 1,0 1,-14 3,24-1,12 2,17 1,66 2,146-3,-28-3,-207-3,0 0,0 0,0 0,0 1,-1-1,1 1,0 0,0 0,-1 0,1 0,0 0,-1 0,1 1,-1-1,1 1,-1 0,3 2,-5-3,0-1,1 1,-1-1,0 1,0-1,0 1,0-1,1 1,-1 0,0-1,0 1,0-1,0 1,0-1,0 1,-1 0,1-1,0 1,0-1,0 1,0-1,-1 1,1-1,0 1,0-1,-1 1,1-1,-1 1,-26 16,-6-9,-1-1,0-1,0-2,0-1,0-2,-35-3,41 2,-16-1</inkml:trace>
+</inkml:ink>
+</file>
+
+<file path=ppt/ink/ink11.xml><?xml version="1.0" encoding="utf-8"?>
+<inkml:ink xmlns:inkml="http://www.w3.org/2003/InkML">
+  <inkml:definitions>
+    <inkml:context xml:id="ctx0">
+      <inkml:inkSource xml:id="inkSrc0">
+        <inkml:traceFormat>
+          <inkml:channel name="X" type="integer" min="-2.14748E9" max="2.14748E9" units="cm"/>
+          <inkml:channel name="Y" type="integer" min="-2.14748E9" max="2.14748E9" units="cm"/>
+        </inkml:traceFormat>
+        <inkml:channelProperties>
+          <inkml:channelProperty channel="X" name="resolution" value="1000" units="1/cm"/>
+          <inkml:channelProperty channel="Y" name="resolution" value="1000" units="1/cm"/>
+        </inkml:channelProperties>
+      </inkml:inkSource>
+      <inkml:timestamp xml:id="ts0" timeString="2021-06-07T23:03:24.588"/>
+    </inkml:context>
+    <inkml:brush xml:id="br0">
+      <inkml:brushProperty name="width" value="0.05" units="cm"/>
+      <inkml:brushProperty name="height" value="0.05" units="cm"/>
+      <inkml:brushProperty name="color" value="#FFFFFF"/>
+      <inkml:brushProperty name="ignorePressure" value="1"/>
+    </inkml:brush>
+  </inkml:definitions>
+  <inkml:trace contextRef="#ctx0" brushRef="#br0">583 417,'859'0,"-838"2,-48 3,23-4,-258 44,-1-11,-370 0,601-34,-34 0,-74-9,107-1,32 9,1 1,0 0,0 0,-1-1,1 1,0 0,0-1,0 1,0 0,0 0,-1-1,1 1,0 0,0-1,0 1,0 0,0-1,0 1,0 0,0-1,0 1,0 0,0-1,0 1,0 0,0-1,1 1,-1 0,0 0,0-1,0 1,0 0,1-1,-1 1,0 0,0 0,0 0,1-1,-1 1,0 0,0 0,1 0,-1-1,0 1,1 0,7-5,0 1,0 1,1-1,-1 1,14-3,291-57,-84 19,337-66,-548 106,-28 2,-33 3,-284 36,395-31,490-8,-504 0,-1-3,0-2,0-2,92-30,-130 32,-19 3,-30 7,6 7,0 1,1 1,-30 19,-35 15,75-39,12-6,1 0,-1 0,1 1,0 0,-1 0,1 0,0 0,0 1,1-1,-6 5,27-7,293-94,201-37,-495 126,-29 6,-52 14,0 3,-64 28,28-10,66-24,-96 33,-264 56,337-93,30-5,-1 1,-31 9,554-210,-451 179,-32 13,-1 0,-1-1,18-11,-28 17,0 0,0 0,-1 0,1 0,0 0,0 0,0 0,-1-1,1 1,0 0,0 0,0 0,0 0,0 0,-1 0,1 0,0 0,0 0,0-1,0 1,0 0,0 0,-1 0,1 0,0 0,0-1,0 1,0 0,0 0,0 0,0 0,0-1,0 1,0 0,0 0,0 0,0 0,0-1,0 1,0 0,0 0,0 0,0 0,0-1,0 1,0 0,0 0,0 0,0 0,0-1,1 1,-1 0,0 0,0 0,0 0,0 0,0 0,0-1,1 1,-1 0,0 0,0 0,0 0,0 0,0 0,1 0,-42 6,-261 90,78-21,193-67,50-16,6-2,201-80,308-140,-492 204,-42 26,0 0,0 0,0 0,-1 0,1 0,0 0,0 0,-1 0,1 0,0 0,0 0,0 0,-1 0,1 0,0-1,0 1,0 0,-1 0,1 0,0 0,0 0,0 0,0-1,-1 1,1 0,0 0,0 0,0 0,0-1,0 1,0 0,0 0,-1 0,1-1,0 1,0 0,0 0,0-1,0 1,0 0,0 0,0 0,0-1,0 1,0 0,0 0,0-1,0 1,1 0,-1 0,0 0,0-1,0 1,0 0,0 0,0-1,-24 6,-267 110,97-33,133-62,42-14,0 0,0 1,1 1,-1 1,-19 13,38-19,13-6,45-14,102-44,-9 1,231-58,-357 111,-46 13,-162 50,-147 36,297-86,13-3,1 1,-1 0,1 2,0 0,0 1,-25 14,44-21,-1 0,0 0,1 0,-1 0,1 1,-1-1,0 0,1 0,-1 1,1-1,-1 0,1 1,-1-1,1 1,-1-1,1 1,-1-1,1 1,0-1,-1 1,1-1,0 1,-1 0,1-1,0 1,0-1,0 1,-1 0,1-1,0 1,0 0,0-1,0 1,0-1,0 2,23 4,32-8,-49 1,-9 2,-22 4,-4 1,-21 5</inkml:trace>
+</inkml:ink>
+</file>
+
+<file path=ppt/ink/ink12.xml><?xml version="1.0" encoding="utf-8"?>
+<inkml:ink xmlns:inkml="http://www.w3.org/2003/InkML">
+  <inkml:definitions>
+    <inkml:context xml:id="ctx0">
+      <inkml:inkSource xml:id="inkSrc0">
+        <inkml:traceFormat>
+          <inkml:channel name="X" type="integer" min="-2.14748E9" max="2.14748E9" units="cm"/>
+          <inkml:channel name="Y" type="integer" min="-2.14748E9" max="2.14748E9" units="cm"/>
+        </inkml:traceFormat>
+        <inkml:channelProperties>
+          <inkml:channelProperty channel="X" name="resolution" value="1000" units="1/cm"/>
+          <inkml:channelProperty channel="Y" name="resolution" value="1000" units="1/cm"/>
+        </inkml:channelProperties>
+      </inkml:inkSource>
+      <inkml:timestamp xml:id="ts0" timeString="2021-06-07T23:03:26.791"/>
+    </inkml:context>
+    <inkml:brush xml:id="br0">
+      <inkml:brushProperty name="width" value="0.05" units="cm"/>
+      <inkml:brushProperty name="height" value="0.05" units="cm"/>
+      <inkml:brushProperty name="color" value="#FFFFFF"/>
+      <inkml:brushProperty name="ignorePressure" value="1"/>
+    </inkml:brush>
+  </inkml:definitions>
+  <inkml:trace contextRef="#ctx0" brushRef="#br0">1 236,'570'0,"-1024"0,1162 0,-654-4,-1-1,105-26,-98 17,120-11,235 23,-202 4,-173-5,0-2,0-1,0-2,-1-3,0 0,48-23,-27 14,1 2,114-18,-138 32</inkml:trace>
+</inkml:ink>
+</file>
+
+<file path=ppt/ink/ink2.xml><?xml version="1.0" encoding="utf-8"?>
+<inkml:ink xmlns:inkml="http://www.w3.org/2003/InkML">
+  <inkml:definitions>
+    <inkml:context xml:id="ctx0">
+      <inkml:inkSource xml:id="inkSrc0">
+        <inkml:traceFormat>
+          <inkml:channel name="X" type="integer" min="-2.14748E9" max="2.14748E9" units="cm"/>
+          <inkml:channel name="Y" type="integer" min="-2.14748E9" max="2.14748E9" units="cm"/>
+        </inkml:traceFormat>
+        <inkml:channelProperties>
+          <inkml:channelProperty channel="X" name="resolution" value="1000" units="1/cm"/>
+          <inkml:channelProperty channel="Y" name="resolution" value="1000" units="1/cm"/>
+        </inkml:channelProperties>
+      </inkml:inkSource>
+      <inkml:timestamp xml:id="ts0" timeString="2021-06-07T23:01:44.083"/>
+    </inkml:context>
+    <inkml:brush xml:id="br0">
+      <inkml:brushProperty name="width" value="0.1" units="cm"/>
+      <inkml:brushProperty name="height" value="0.6" units="cm"/>
+      <inkml:brushProperty name="color" value="#FFFFFF"/>
+      <inkml:brushProperty name="ignorePressure" value="1"/>
+      <inkml:brushProperty name="inkEffects" value="pencil"/>
+    </inkml:brush>
+  </inkml:definitions>
+  <inkml:trace contextRef="#ctx0" brushRef="#br0">0 0,'0'0</inkml:trace>
+</inkml:ink>
+</file>
+
+<file path=ppt/ink/ink3.xml><?xml version="1.0" encoding="utf-8"?>
+<inkml:ink xmlns:inkml="http://www.w3.org/2003/InkML">
+  <inkml:definitions>
+    <inkml:context xml:id="ctx0">
+      <inkml:inkSource xml:id="inkSrc0">
+        <inkml:traceFormat>
+          <inkml:channel name="X" type="integer" min="-2.14748E9" max="2.14748E9" units="cm"/>
+          <inkml:channel name="Y" type="integer" min="-2.14748E9" max="2.14748E9" units="cm"/>
+        </inkml:traceFormat>
+        <inkml:channelProperties>
+          <inkml:channelProperty channel="X" name="resolution" value="1000" units="1/cm"/>
+          <inkml:channelProperty channel="Y" name="resolution" value="1000" units="1/cm"/>
+        </inkml:channelProperties>
+      </inkml:inkSource>
+      <inkml:timestamp xml:id="ts0" timeString="2021-06-07T23:01:47.836"/>
+    </inkml:context>
+    <inkml:brush xml:id="br0">
+      <inkml:brushProperty name="width" value="0.1" units="cm"/>
+      <inkml:brushProperty name="height" value="0.6" units="cm"/>
+      <inkml:brushProperty name="color" value="#FFFFFF"/>
+      <inkml:brushProperty name="ignorePressure" value="1"/>
+      <inkml:brushProperty name="inkEffects" value="pencil"/>
+    </inkml:brush>
+  </inkml:definitions>
+  <inkml:trace contextRef="#ctx0" brushRef="#br0">0 1,'0'0</inkml:trace>
+</inkml:ink>
+</file>
+
+<file path=ppt/ink/ink4.xml><?xml version="1.0" encoding="utf-8"?>
+<inkml:ink xmlns:inkml="http://www.w3.org/2003/InkML">
+  <inkml:definitions>
+    <inkml:context xml:id="ctx0">
+      <inkml:inkSource xml:id="inkSrc0">
+        <inkml:traceFormat>
+          <inkml:channel name="X" type="integer" min="-2.14748E9" max="2.14748E9" units="cm"/>
+          <inkml:channel name="Y" type="integer" min="-2.14748E9" max="2.14748E9" units="cm"/>
+        </inkml:traceFormat>
+        <inkml:channelProperties>
+          <inkml:channelProperty channel="X" name="resolution" value="1000" units="1/cm"/>
+          <inkml:channelProperty channel="Y" name="resolution" value="1000" units="1/cm"/>
+        </inkml:channelProperties>
+      </inkml:inkSource>
+      <inkml:timestamp xml:id="ts0" timeString="2021-06-07T23:02:03.882"/>
+    </inkml:context>
+    <inkml:brush xml:id="br0">
+      <inkml:brushProperty name="width" value="0.05" units="cm"/>
+      <inkml:brushProperty name="height" value="0.05" units="cm"/>
+      <inkml:brushProperty name="color" value="#FFFFFF"/>
+      <inkml:brushProperty name="ignorePressure" value="1"/>
+    </inkml:brush>
+  </inkml:definitions>
+  <inkml:trace contextRef="#ctx0" brushRef="#br0">769 253,'-344'0,"353"1,0 1,0-1,0 2,11 3,20 5,54 9,-44-9,1-1,84 4,-22-13,-112-1,0 0,0 0,0 0,0 0,0 0,0 0,0 0,0 1,0-1,-1 0,1 0,0 1,0-1,0 1,0-1,-1 1,1-1,0 1,-1-1,1 1,0 0,0 1,-1-1,0-1,0 1,0 0,0 0,0-1,0 1,0 0,-1 0,1-1,0 1,0 0,-1 0,1-1,-1 1,1 0,-1-1,1 1,-1-1,1 1,-2 0,-41 31,37-28,-148 81,114-67,1 3,1 1,1 1,-43 37,156-120,44-38,-13 11,-106 86,0 1,0-1,0 0,0 1,0-1,-1 0,1 0,0 0,-1 1,1-1,-1 0,1 0,-1 0,1 0,-1 0,1 0,-1 0,0 0,0 0,0-1,1 1,-1 0,0 0,0 0,-1 0,1 0,0-2,-1 2,-1-1,1 1,0 0,0 0,-1 0,1 0,0 0,-1 0,1 0,-1 1,1-1,-1 0,0 1,1-1,-4 0,-11-2,-1 1,-30 0,38 2,-31 0,0 2,0 2,-65 14,-115 44,87-23,48-12,150-61,1 4,2 2,0 3,2 3,129-23,-197 45,-1-1,0 1,0 0,1 0,-1-1,0 1,1 0,-1 0,0 0,1 0,-1 1,0-1,0 0,1 0,-1 1,0-1,0 1,1-1,-1 1,1 0,-2 0,0 0,0 0,0-1,0 1,0 0,0 0,0-1,0 1,-1 0,1 0,0-1,0 1,-1 0,1 0,-1-1,1 1,0 0,-1-1,1 1,-1-1,0 1,1-1,-2 1,-48 41,47-40,-38 25,-51 25,49-30,-41 30,82-51,1 0,-1 0,0 0,1 0,-1 0,1 0,-1 0,1 1,0-1,0 0,-1 1,1-1,0 1,0 0,0-1,0 1,1 0,-1-1,0 1,1 0,-1 0,0 3,2-4,0 0,0 1,0-1,0 0,0 0,0 0,0 0,0 0,1 0,-1 0,0-1,0 1,1 0,-1-1,1 1,-1-1,1 1,-1-1,0 0,1 0,1 1,18 1,0 0,36-2,-53 0,106-9,-1-5,-1-5,173-52,-258 64,0 1,44-17,-64 22,1-1,-1 1,1-1,-1 0,0 0,0 0,1-1,-1 1,-1-1,1 1,0-1,-1 0,1 0,-1 0,0 0,0-1,0 1,-1 0,3-6,-4 7,0 0,0 1,0-1,0 0,-1 0,1 0,-1 0,1 1,-1-1,1 0,-1 0,0 1,0-1,0 1,0-1,0 0,0 1,0 0,-1-1,1 1,0 0,-1 0,1 0,-1-1,1 2,-1-1,0 0,1 0,-1 0,-3 0,-7-3,-1 0,1 1,-17-3,27 6,-80-10,-1 4,-136 8,147 3,2 4,-1 3,2 3,0 3,1 3,1 3,-106 54,126-49,46-29,1 0,-1 0,1 1,-1-1,0 0,1 1,-1-1,1 0,-1 1,1-1,-1 1,1-1,0 1,-1-1,1 1,-1-1,1 1,0-1,-1 1,1-1,0 1,0 0,0-1,-1 1,1 0,0-1,0 1,0-1,0 1,0 0,0-1,0 1,0 0,0-1,1 1,-1 0,0-1,0 1,0-1,1 1,-1 0,0-1,1 1,-1-1,1 1,-1-1,0 1,1-1,-1 1,1-1,-1 0,1 1,-1-1,1 0,0 1,-1-1,1 0,-1 0,1 0,0 1,-1-1,1 0,0 0,-1 0,1 0,0 0,16 3,0 0,0-1,0-1,0 0,0-1,0-1,19-4,121-29,-126 26,54-17,-1-5,100-50,-32 13,105-61,-184 89,-16 10,-17 9,0-2,38-28,-99 64,0-1,-1-1,-1-1,-44 16,-105 19,84-31,53-10,-51 13,43-6,24-8,0 1,0 1,1 1,0 0,0 2,-21 13,37-22,1 1,0 0,0-1,-1 1,1 0,0 0,0 0,0 0,0 0,0 0,0 0,1 0,-1 1,0-1,0 0,1 0,-1 1,1-1,-1 0,1 1,0-1,0 1,-1-1,1 3,1-3,0 0,-1 1,1-1,0 0,0 0,0 0,0 0,0 0,0 0,1 0,-1 0,0 0,0 0,1-1,-1 1,0 0,1-1,2 1,8 3,1-1,0-1,25 2,-3-4,1-2,-1-2,1-1,-1-1,-1-3,1 0,45-21,-75 29,-1-1,0-1,0 1,0-1,0 1,-1-1,6-5,-8 7,-1 1,0 0,0 0,0 0,0 0,1 0,-1 0,0-1,0 1,0 0,0 0,1 0,-1-1,0 1,0 0,0 0,0 0,0-1,0 1,0 0,0 0,0 0,0-1,0 1,0 0,0 0,0-1,0 1,0 0,0 0,0 0,0-1,0 1,0 0,0 0,0-1,0 1,0 0,0 0,-1 0,1-1,0 1,0 0,-1 0,-22 3,-5 6,2 1,-1 1,-42 26,-75 56,74-45,-242 120,232-129,59-27,30-16,37-17,22-19,91-73,-71 48,-56 42</inkml:trace>
+</inkml:ink>
+</file>
+
+<file path=ppt/ink/ink5.xml><?xml version="1.0" encoding="utf-8"?>
+<inkml:ink xmlns:inkml="http://www.w3.org/2003/InkML">
+  <inkml:definitions>
+    <inkml:context xml:id="ctx0">
+      <inkml:inkSource xml:id="inkSrc0">
+        <inkml:traceFormat>
+          <inkml:channel name="X" type="integer" min="-2.14748E9" max="2.14748E9" units="cm"/>
+          <inkml:channel name="Y" type="integer" min="-2.14748E9" max="2.14748E9" units="cm"/>
+        </inkml:traceFormat>
+        <inkml:channelProperties>
+          <inkml:channelProperty channel="X" name="resolution" value="1000" units="1/cm"/>
+          <inkml:channelProperty channel="Y" name="resolution" value="1000" units="1/cm"/>
+        </inkml:channelProperties>
+      </inkml:inkSource>
+      <inkml:timestamp xml:id="ts0" timeString="2021-06-07T23:02:48.937"/>
+    </inkml:context>
+    <inkml:brush xml:id="br0">
+      <inkml:brushProperty name="width" value="0.3" units="cm"/>
+      <inkml:brushProperty name="height" value="0.6" units="cm"/>
+      <inkml:brushProperty name="color" value="#FFFFFF"/>
+      <inkml:brushProperty name="tip" value="rectangle"/>
+      <inkml:brushProperty name="rasterOp" value="maskPen"/>
+      <inkml:brushProperty name="ignorePressure" value="1"/>
+    </inkml:brush>
+  </inkml:definitions>
+  <inkml:trace contextRef="#ctx0" brushRef="#br0">1542 137,'-32'15,"-1"-2,-1-2,0 0,-48 7,-141 8,187-23,-848 19,861-22,0-2,0 0,0-1,-43-13,42 2,24 13,0 1,0 0,-1-1,1 1,0-1,0 1,0 0,0-1,0 1,0-1,0 1,0 0,0-1,0 1,0-1,0 1,0-1,0 1,0 0,0-1,0 1,1 0,-1-1,0 1,0-1,0 1,1 0,-1-1,0 1,0 0,1-1,-1 1,1 0,3-3,-1 1,1 0,0 0,1 0,-1 1,0-1,0 1,1 0,4-1,94-9,0 4,116 8,-104 0,563 3,-660-4,1 0,-1 2,19 3,-20 3,-24-1,-28 2,-48-2,1-2,-84-8,154 3,1-1,0 0,-1 0,1-1,0-1,-14-4,25 7,1 0,-1 0,0 0,0 0,0 0,0 0,1-1,-1 1,0 0,0 0,0 0,0 0,1 0,-1 0,0 0,0-1,0 1,0 0,0 0,0 0,1 0,-1-1,0 1,0 0,0 0,0 0,0 0,0-1,0 1,0 0,0 0,0 0,0-1,0 1,0 0,0 0,0 0,0-1,0 1,0 0,0 0,0 0,0 0,0-1,-1 1,1 0,0 0,0 0,0 0,0-1,0 1,0 0,-1 0,1 0,0 0,0 0,0 0,0 0,-1-1,1 1,0 0,0 0,0 0,0 0,-1 0,1 0,18-5,0 1,1 1,-1 0,1 2,0 0,29 2,4-1,695 0,-806-5,0-3,0-2,-88-27,15 4,-212-33,273 50</inkml:trace>
+</inkml:ink>
+</file>
+
+<file path=ppt/ink/ink6.xml><?xml version="1.0" encoding="utf-8"?>
+<inkml:ink xmlns:inkml="http://www.w3.org/2003/InkML">
+  <inkml:definitions>
+    <inkml:context xml:id="ctx0">
+      <inkml:inkSource xml:id="inkSrc0">
+        <inkml:traceFormat>
+          <inkml:channel name="X" type="integer" min="-2.14748E9" max="2.14748E9" units="cm"/>
+          <inkml:channel name="Y" type="integer" min="-2.14748E9" max="2.14748E9" units="cm"/>
+        </inkml:traceFormat>
+        <inkml:channelProperties>
+          <inkml:channelProperty channel="X" name="resolution" value="1000" units="1/cm"/>
+          <inkml:channelProperty channel="Y" name="resolution" value="1000" units="1/cm"/>
+        </inkml:channelProperties>
+      </inkml:inkSource>
+      <inkml:timestamp xml:id="ts0" timeString="2021-06-07T23:02:53.188"/>
+    </inkml:context>
+    <inkml:brush xml:id="br0">
+      <inkml:brushProperty name="width" value="0.3" units="cm"/>
+      <inkml:brushProperty name="height" value="0.6" units="cm"/>
+      <inkml:brushProperty name="color" value="#FFFFFF"/>
+      <inkml:brushProperty name="tip" value="rectangle"/>
+      <inkml:brushProperty name="rasterOp" value="maskPen"/>
+      <inkml:brushProperty name="ignorePressure" value="1"/>
+    </inkml:brush>
+  </inkml:definitions>
+  <inkml:trace contextRef="#ctx0" brushRef="#br0">1191 1537,'39'2,"-1"2,0 2,68 19,27 4,-115-26,-4-2,0 2,1 0,19 7,-34-10,1 0,-1 0,0 0,1 0,-1 0,1 0,-1 0,1 0,-1 0,0 0,1 0,-1 0,1 0,-1 1,0-1,1 0,-1 0,1 1,-1-1,0 0,1 0,-1 1,0-1,0 0,1 1,-1-1,0 0,0 1,1-1,-1 1,0-1,0 0,0 1,0-1,0 1,0-1,0 1,1-1,-1 0,0 1,-1-1,1 1,0 0,-23 6,-18-5,0-1,1-2,-59-9,-128-32,143 24,-241-50,-349-59,665 126,-5-1,-1 0,1 0,0-2,-16-5,30 9,0 0,0 0,0 0,0 0,1 0,-1-1,0 1,0 0,0 0,0 0,0 0,0 0,0 0,1 0,-1 0,0 0,0 0,0-1,0 1,0 0,0 0,0 0,0 0,0 0,0 0,0-1,0 1,0 0,0 0,0 0,0 0,0 0,0 0,0-1,0 1,0 0,0 0,0 0,0 0,0 0,0-1,0 1,0 0,0 0,0 0,0 0,0 0,0 0,0 0,-1-1,1 1,0 0,0 0,0 0,0 0,0 0,0 0,0 0,-1 0,1 0,0 0,0 0,0 0,0 0,0 0,-1 0,21-5,31-1,51 7,171 21,105 40,-335-54,1241 238,-1262-242,-11-3,0 1,1 0,-1 0,0 1,0 1,-1 0,1 0,18 12,-29-16,1 0,0 0,-1 1,1-1,-1 0,1 1,-1-1,0 1,1-1,-1 0,1 1,-1-1,1 1,-1-1,0 1,0-1,1 1,-1-1,0 1,0 0,1-1,-1 1,0-1,0 1,0-1,0 1,0 0,0-1,0 1,0 0,0-1,0 1,0-1,0 1,-1-1,1 1,0 0,0-1,-1 1,1 0,-24 10,9-9,1-1,-1 0,0-1,0 0,1-2,-22-3,17 2,-850-160,569 100,277 58,6 3,1-1,0-1,0 0,0-1,1-1,-29-15,43 20,0 1,0-1,0 0,0 0,0 0,0 0,0 0,0 0,0 0,0 0,0 0,1 0,-1 0,0-1,1 1,-1 0,1 0,0-1,-1 1,1 0,0-1,0 1,0 0,0-1,0 1,0-1,0 1,0 0,0-1,1 1,-1 0,1-1,-1 1,1 0,-1 0,1 0,0-1,-1 1,1 0,0 0,0 0,0 0,0 0,0 0,0 0,0 1,0-1,2-1,6-5,1 0,1 0,-1 1,13-5,70-27,185-49,-178 59,224-46,-317 73,9-1,0-1,-1-1,1 0,-1-1,25-11,-38 15,-1 0,0 0,1 1,-1-1,0 0,1 0,-1 0,0-1,0 1,0 0,0 0,0-1,0 1,0 0,-1-1,1 1,0-1,-1 1,1-1,-1 1,0-1,1 1,-1-1,0 0,0 1,0-1,0 1,0-1,0 0,-1 1,1-1,0 1,-1-1,1 1,-1-1,0 1,1-1,-3-1,-3-6,0 0,0 1,-1 0,-14-13,19 19,-51-44,-110-73,86 65,-1008-648,1003 649,56 27,31 21,15 7,80 23,-2 4,161 71,0 1,-89-47,1-8,282 39,-367-75</inkml:trace>
+</inkml:ink>
+</file>
+
+<file path=ppt/ink/ink7.xml><?xml version="1.0" encoding="utf-8"?>
+<inkml:ink xmlns:inkml="http://www.w3.org/2003/InkML">
+  <inkml:definitions>
+    <inkml:context xml:id="ctx0">
+      <inkml:inkSource xml:id="inkSrc0">
+        <inkml:traceFormat>
+          <inkml:channel name="X" type="integer" min="-2.14748E9" max="2.14748E9" units="cm"/>
+          <inkml:channel name="Y" type="integer" min="-2.14748E9" max="2.14748E9" units="cm"/>
+        </inkml:traceFormat>
+        <inkml:channelProperties>
+          <inkml:channelProperty channel="X" name="resolution" value="1000" units="1/cm"/>
+          <inkml:channelProperty channel="Y" name="resolution" value="1000" units="1/cm"/>
+        </inkml:channelProperties>
+      </inkml:inkSource>
+      <inkml:timestamp xml:id="ts0" timeString="2021-06-07T23:02:53.781"/>
+    </inkml:context>
+    <inkml:brush xml:id="br0">
+      <inkml:brushProperty name="width" value="0.3" units="cm"/>
+      <inkml:brushProperty name="height" value="0.6" units="cm"/>
+      <inkml:brushProperty name="color" value="#FFFFFF"/>
+      <inkml:brushProperty name="tip" value="rectangle"/>
+      <inkml:brushProperty name="rasterOp" value="maskPen"/>
+      <inkml:brushProperty name="ignorePressure" value="1"/>
+    </inkml:brush>
+  </inkml:definitions>
+  <inkml:trace contextRef="#ctx0" brushRef="#br0">0 1,'55'24,"1"-2,1-3,61 12,-46-12,935 194,-754-166,396 67,-624-110,9 1,-1 1,-1 1,54 20,-84-26,0-1,1 1,-1 1,0-1,0 0,0 1,0-1,0 1,0-1,0 1,0 0,-1 0,1 0,2 4,-4-5,1 0,-1 0,0 0,0 0,0 0,1 1,-1-1,0 0,-1 0,1 0,0 0,0 1,0-1,-1 0,1 0,0 0,-1 0,1 0,-1 0,0 0,1 0,-2 1,-4 4,0 0,0 0,-1 0,0-1,0 0,-15 7,-28 13,-1-2,-105 32,-120 14,230-59,-597 121,401-83,-53 16,214-42,-118 48,140-42</inkml:trace>
+</inkml:ink>
+</file>
+
+<file path=ppt/ink/ink8.xml><?xml version="1.0" encoding="utf-8"?>
+<inkml:ink xmlns:inkml="http://www.w3.org/2003/InkML">
+  <inkml:definitions>
+    <inkml:context xml:id="ctx0">
+      <inkml:inkSource xml:id="inkSrc0">
+        <inkml:traceFormat>
+          <inkml:channel name="X" type="integer" min="-2.14748E9" max="2.14748E9" units="cm"/>
+          <inkml:channel name="Y" type="integer" min="-2.14748E9" max="2.14748E9" units="cm"/>
+        </inkml:traceFormat>
+        <inkml:channelProperties>
+          <inkml:channelProperty channel="X" name="resolution" value="1000" units="1/cm"/>
+          <inkml:channelProperty channel="Y" name="resolution" value="1000" units="1/cm"/>
+        </inkml:channelProperties>
+      </inkml:inkSource>
+      <inkml:timestamp xml:id="ts0" timeString="2021-06-07T23:02:54.530"/>
+    </inkml:context>
+    <inkml:brush xml:id="br0">
+      <inkml:brushProperty name="width" value="0.3" units="cm"/>
+      <inkml:brushProperty name="height" value="0.6" units="cm"/>
+      <inkml:brushProperty name="color" value="#FFFFFF"/>
+      <inkml:brushProperty name="tip" value="rectangle"/>
+      <inkml:brushProperty name="rasterOp" value="maskPen"/>
+      <inkml:brushProperty name="ignorePressure" value="1"/>
+    </inkml:brush>
+  </inkml:definitions>
+  <inkml:trace contextRef="#ctx0" brushRef="#br0">966 1,'0'4,"-1"0,0 0,0 0,0 0,0-1,-1 1,1 0,-1-1,0 1,0-1,-1 1,1-1,-1 0,1 0,-1 0,0 0,-3 2,-8 6,0-1,-25 15,5-6,-1-2,-1-1,-1-2,0-1,0-2,-1-2,-73 8,-183-6,142-8,102 2,50-5,0 0,0 0,0 0,1 1,-1-1,0 0,0 0,0 0,0 0,0 0,0 1,0-1,0 0,0 0,1 0,-1 0,0 1,0-1,0 0,0 0,0 0,0 1,0-1,0 0,0 0,0 0,-1 0,1 1,0-1,0 0,0 0,0 0,0 0,0 1,0-1,0 0,0 0,0 0,-1 0,1 0,0 0,0 1,0-1,0 0,0 0,-1 0,1 0,0 0,0 0,0 0,-1 0,14 4,-1-1,0-1,1 0,-1-1,20-1,1 2,1022-17,-933 7</inkml:trace>
+</inkml:ink>
+</file>
+
+<file path=ppt/ink/ink9.xml><?xml version="1.0" encoding="utf-8"?>
+<inkml:ink xmlns:inkml="http://www.w3.org/2003/InkML">
+  <inkml:definitions>
+    <inkml:context xml:id="ctx0">
+      <inkml:inkSource xml:id="inkSrc0">
+        <inkml:traceFormat>
+          <inkml:channel name="X" type="integer" min="-2.14748E9" max="2.14748E9" units="cm"/>
+          <inkml:channel name="Y" type="integer" min="-2.14748E9" max="2.14748E9" units="cm"/>
+        </inkml:traceFormat>
+        <inkml:channelProperties>
+          <inkml:channelProperty channel="X" name="resolution" value="1000" units="1/cm"/>
+          <inkml:channelProperty channel="Y" name="resolution" value="1000" units="1/cm"/>
+        </inkml:channelProperties>
+      </inkml:inkSource>
+      <inkml:timestamp xml:id="ts0" timeString="2021-06-07T23:03:17.186"/>
+    </inkml:context>
+    <inkml:brush xml:id="br0">
+      <inkml:brushProperty name="width" value="0.05" units="cm"/>
+      <inkml:brushProperty name="height" value="0.05" units="cm"/>
+      <inkml:brushProperty name="color" value="#FFFFFF"/>
+      <inkml:brushProperty name="ignorePressure" value="1"/>
+    </inkml:brush>
+  </inkml:definitions>
+  <inkml:trace contextRef="#ctx0" brushRef="#br0">786 431,'0'-1,"1"1,-1 0,1-1,-1 1,0-1,1 1,-1 0,1-1,-1 1,0-1,1 1,-1-1,0 1,0-1,1 0,-1 1,0-1,0 1,0-1,0 1,0-1,0 0,0 1,0-1,0 1,0-1,0 1,0-1,0 0,0 1,-1-1,1 1,0-1,0 1,-1-1,1 1,0-1,-1 1,1-1,0 1,-1-1,1 1,-1 0,1-1,-1 1,-28-14,20 12,-23-10,10 5,1-1,1 0,-1-1,2-2,-1 0,-19-15,39 26,-1 0,1-1,-1 1,1-1,0 1,-1 0,1-1,0 1,-1-1,1 1,0-1,0 1,-1-1,1 1,0-1,0 1,0-1,0 1,0-1,0 1,0-1,0 0,0 1,0-1,0 1,0-1,0 1,0-1,0 1,0-1,1 1,-1-1,0 1,0-1,1 1,-1-1,0 1,1-1,-1 1,1 0,-1-1,0 1,1 0,-1-1,1 1,-1 0,1 0,-1-1,1 1,-1 0,1 0,-1 0,1 0,-1-1,1 1,-1 0,1 0,0 0,-1 0,1 1,36-8,-37 7,36-2,72 4,-82 5,-26-7,0 0,1 0,-1 0,0 0,0 1,0-1,0 0,0 0,1 1,-1-1,0 0,0 0,0 0,0 1,0-1,0 0,0 0,0 1,0-1,0 0,0 0,0 1,0-1,0 0,0 0,0 1,0-1,0 0,0 0,0 1,-1-1,1 0,0 0,0 0,0 1,0-1,0 0,-1 0,1 0,0 1,0-1,0 0,-1 0,1 0,-4 3,1-1,-1 0,0 0,0-1,0 1,0-1,0 0,-6 1,4-1,-1 0,1 1,0 0,-1 0,-10 5,17-7,-1 0,1 1,-1-1,1 0,-1 1,1-1,-1 0,1 1,0-1,-1 1,1-1,0 1,-1-1,1 1,0-1,-1 1,1-1,0 1,0-1,0 1,0-1,0 1,0 0,-1-1,1 1,0-1,1 1,-1 0,1 1,0 0,0 0,0 0,0-1,0 1,1-1,-1 1,1-1,-1 1,1-1,-1 0,1 0,2 2,13 6,1 0,0-1,1 0,21 5,19 8,-59-21,0 0,0 0,0 0,-1 0,1 0,0 0,0 0,0 0,-1 0,1 0,0 0,0 0,0 0,0 0,0 1,-1-1,1 0,0 0,0 0,0 0,0 0,0 1,0-1,0 0,-1 0,1 0,0 0,0 1,0-1,0 0,0 0,0 0,0 1,0-1,0 0,0 0,0 0,0 1,0-1,0 0,0 0,0 0,0 0,0 1,1-1,-1 0,0 0,0 0,0 0,0 1,0-1,0 0,1 0,-26 3,-288-6,247-2,1-3,-112-30,155 29,22 9,0-1,-1 1,1 0,0 0,0 0,0 0,0 0,0-1,0 1,0 0,0 0,0 0,0-1,0 1,0 0,0 0,0 0,0-1,0 1,0 0,0 0,0 0,0 0,0-1,0 1,0 0,0 0,0 0,0-1,0 1,0 0,0 0,1 0,-1 0,0 0,0-1,0 1,0 0,0 0,1 0,-1 0,0 0,0 0,0 0,0 0,1-1,-1 1,0 0,1 0,42-8,358 4,-366 4,-78 1,-13 0,0-1,-1-4,-75-13,102 4,30 13,0 0,1-1,-1 1,0-1,0 1,1 0,-1-1,0 1,1 0,-1-1,0 1,1 0,-1-1,0 1,1 0,-1 0,1-1,-1 1,0 0,1 0,-1 0,1 0,-1 0,1 0,-1-1,1 1,-1 0,1 0,-1 0,1 1,-1-1,1 0,64-4,365 9,-835-6,357 2,35 3,15 2,19 6,3-3,1 0,0-2,1-1,40 5,111 1,-80-7,-40 5,-36 2,-21-12,0 1,0-1,1 1,-1 0,0-1,0 1,0-1,0 1,0-1,0 1,0 0,0-1,0 1,-1-1,1 1,0-1,0 1,0-1,-1 1,1-1,0 1,0-1,-1 1,1-1,-1 1,1-1,0 1,-1-1,1 0,-1 1,1-1,-1 0,1 1,-1-1,1 0,-1 0,-19 12,1 0,-1-2,-1-1,0 0,-31 8,-2-3,-61 7,78-16,-11 3,97-6,59-1,161-7,-249 1,-20 5,0 0,0-1,0 1,0 0,1 0,-1 0,0 0,0 0,0-1,0 1,0 0,0 0,0 0,0 0,0 0,0-1,0 1,0 0,0 0,0 0,0 0,0-1,0 1,0 0,0 0,0 0,0 0,0-1,0 1,0 0,0 0,0 0,0 0,0-1,-1 1,1 0,0 0,0 0,0 0,0 0,0 0,0 0,-1-1,1 1,0 0,0 0,0 0,-1 0,-30-11,-73-7,-452-92,550 108,7 0,18-1,31 1,-13 2,-2 1,0-1,0-2,0-2,49-11,-82 15,0 0,0-1,0 1,0-1,0 1,0-1,0 0,0 0,0 0,0 0,-1 0,1 0,0-1,-1 1,1 0,-1-1,0 1,1-1,-1 0,0 1,2-4,-4 3,1 0,-1 0,0 1,1-1,-1 0,0 1,0-1,0 1,0-1,-1 1,1-1,0 1,-1 0,1-1,-1 1,1 0,-1 0,1 0,-1 0,0 1,1-1,-1 0,-4 0,-25-12,-1 2,-1 1,-50-8,8 2,66 12,10 2,19-1,37 1,537 6,-586-4,-12 0,-23 0,8 0,44 0,745 0,-977 16,51-1,-206-5,1089-12,-451 3,-992-1,1442 0,-1186 20,124-2,315-18,15-1,1 1,-1-1,1 1,-1 1,0-1,1 1,-1 0,1 0,-1 1,1 0,-6 2,11-3,0-1,-1 0,1 1,0-1,0 1,0-1,0 0,0 1,0-1,0 1,0-1,0 1,0-1,0 0,0 1,0-1,0 1,0-1,0 0,1 1,-1-1,0 1,0-1,0 0,1 1,-1-1,0 0,1 1,-1-1,0 0,1 1,-1-1,0 0,1 0,-1 1,0-1,1 0,-1 0,1 0,-1 0,0 0,1 1,15 6,0 0,1-1,0 0,0-2,0 0,0-1,29 2,6 2,303 33,-265-32,-84-8,-1 1,1 0,-1 1,1-1,-1 1,7 3,-11-5,-1 0,1 1,-1-1,0 0,1 0,-1 1,1-1,-1 0,0 0,1 1,-1-1,0 0,1 1,-1-1,0 1,0-1,1 0,-1 1,0-1,0 1,0-1,0 1,1-1,-1 0,0 1,0-1,0 1,0-1,0 1,0 0,-1 0,0 0,0 0,0 1,0-1,0 0,0 0,-1-1,1 1,0 0,0 0,-1 0,1-1,-1 1,1-1,-2 1,-21 7,0-2,0-1,-1-1,1 0,-1-2,-34-2,-155-16,-282-72,347 57,115 22,35 9,-1 0,0 0,0 0,0 0,0 0,0 0,0 0,0 0,0 0,1-1,-1 1,0 0,0 0,0 0,0 0,0 0,0 0,0-1,0 1,0 0,0 0,0 0,0 0,0 0,0-1,0 1,0 0,0 0,0 0,0 0,0 0,0-1,0 1,0 0,0 0,0 0,0 0,-1 0,1 0,0 0,0-1,0 1,0 0,0 0,0 0,0 0,0 0,-1 0,1 0,0 0,0 0,0 0,0 0,0-1,0 1,-1 0,1 0,0 0,0 0,0 0,0 0,0 0,-1 0,1 0,0 0,0 1,0-1,54-5,804 7,-393 1,-1380-3,910 0,-31 0,-63 7,78 1,34-1,41 1,287 0,-95-5,-234-2,-6-2,1 1,0 0,-1 1,1 0,0 0,-1 0,1 1,-1 0,9 4,-14-6,-1 0,0 1,0-1,0 0,0 0,0 0,0 0,1 1,-1-1,0 0,0 0,0 0,0 1,0-1,0 0,0 0,0 1,0-1,0 0,0 0,0 0,0 1,0-1,0 0,0 0,0 1,-1-1,1 0,0 0,0 0,0 0,0 1,0-1,0 0,-1 0,1 0,0 0,0 1,0-1,0 0,-1 0,1 0,0 0,0 0,0 0,-1 0,1 0,0 1,0-1,0 0,-1 0,1 0,0 0,0 0,-1 0,1 0,0 0,0 0,0-1,-1 1,1 0,0 0,-23 5,0-1,-1 0,1-2,-1-1,-25-2,-5 1,-440 1,149-1,1518 0,-1144 1,-55 4,-371 26,-12-28,294-3,53-1,39 1,21 0,9 0,602-1,-753 1,-630-23,715 15,-31 0,432 7,-184 5,202-22,-329 15,-28 3,-7 2,-46 11,26-7,-102 20,-1-4,-1-7,-231 0,258-22,0-4,-154-37,230 38,25 9,0 1,0 0,0-1,0 1,0 0,0 0,0-1,0 1,0 0,0-1,0 1,0 0,0-1,0 1,0 0,1-1,-1 1,0 0,0 0,0-1,0 1,1 0,-1 0,0-1,0 1,1 0,-1 0,0 0,0-1,1 1,-1 0,0 0,0 0,1 0,-1 0,0 0,1 0,0-1,46-12,140-19,367-83,-508 100,-46 15,1 0,-1 0,0 0,1 0,-1 0,1 0,-1 0,1 0,-1 0,0-1,1 1,-1 0,1 0,-1 0,0-1,1 1,-1 0,0-1,1 1,-1 0,0-1,0 1,1 0,-1-1,0 1,0 0,0-1,1 1,-1-1,0 1,0 0,0-1,0 1,0-1,0 0,-15-4,-30 1,-205 5,82 1,510 20,-61-3,-492-20,858 1,-1349 0,1958 0,-1471 16,63-2,-202-4,498-10,-15 2,0-6,170-27,-295 31,1-1,-1 0,0-1,1 1,-1-1,0 1,0-1,0-1,6-3,-10 6,0 0,0 0,0-1,1 1,-1 0,0 0,0 0,0-1,1 1,-1 0,0-1,0 1,0 0,0 0,0-1,0 1,0 0,0-1,0 1,0 0,0 0,0-1,0 1,0 0,0-1,0 1,0 0,0-1,0 1,0 0,0 0,0-1,0 1,-1 0,1 0,0-1,0 1,0 0,-1 0,1-1,0 1,-29-10,-49 2,-1 3,-108 7,89 0,93-1,16-1,41 0,72 1,213-1,-337 0,0 0,0 0,0 0,1-1,-1 1,0 0,0 0,0 0,0 0,1 0,-1 0,0 0,0 0,0 0,1-1,-1 1,0 0,0 0,0 0,1 0,-1 0,0 0,0 0,0 0,1 1,-1-1,0 0,0 0,0 0,1 0,-1 0,0 0,0 0,0 0,1 0,-1 1,0-1,0 0,0 0,0 0,0 0,1 1,-1-1,0 0,0 0,0 0,0 0,0 1,0-1,0 0,0 0,0 0,0 1,0-1,0 0,0 0,0 0,0 1,0-1,-15 10,-31 7,-3-5,-82 9,84-15,-79 20,112-20,14-1,24 1,90 3,187-9,-148-3,-139 3,31-1,-35 1,-19 0,-612 0,725 1,213-5,-247-1,0-2,99-24,-132 16,-91 27,1 1,-75 30,-100 56,214-90,24-8,26-8,190-89,-167 69,-16 3,-42 23,0 1,-1-1,1 1,0-1,0 0,-1 1,1-1,0 0,-1 0,1 0,-1 1,1-1,-1 0,1 0,-1 0,0 0,1 0,-1-1,0 1,-1 1,1-1,-1 0,1 0,-1 1,1-1,-1 0,1 1,-1-1,0 1,1-1,-1 1,0-1,0 1,1 0,-1-1,0 1,0 0,1-1,-1 1,0 0,0 0,0 0,0 0,1 0,-2 0,-30-4,1 3,0 0,0 2,-48 7,40-4,-59 11,-129 36,155-32,49-12,23-7,0 0,1 0,-1 0,0 0,0 0,0 0,0 0,0 0,0 0,0 0,0 0,0 0,1 0,-1 0,0 0,0 0,0 0,0 0,0 0,0 0,0 0,0 0,0 0,0 0,0 0,0 0,0 1,0-1,0 0,1 0,-1 0,0 0,0 0,0 0,0 0,0 0,0 0,0 0,0 1,0-1,0 0,0 0,0 0,0 0,0 0,0 0,0 0,0 0,0 0,0 0,-1 1,1-1,0 0,0 0,0 0,42-2,513-88,-323 46,-68 21,-371 83,196-56,-157 46,-204 35,358-83,-1 1,1 0,0 1,0 0,-21 11,34-15,0 1,0-1,0 1,0-1,1 1,-1-1,0 1,0 0,1-1,-1 1,0 0,1 0,-1-1,0 1,1 0,-1 0,1 0,0 0,-1 0,1 2,0-3,0 1,1 0,-1 0,0-1,1 1,-1 0,1-1,-1 1,1 0,-1-1,1 1,0-1,-1 1,1-1,0 1,-1-1,1 0,0 1,0-1,-1 0,1 1,0-1,0 0,0 0,-1 0,3 0,18 3,0-2,1-1,-1 0,0-2,1 0,-1-1,34-11,-18 6,154-34,-146 27,-45 15,1 0,-1 0,0 0,0 0,1 0,-1 0,0 0,0 0,0 0,1 0,-1 0,0-1,0 1,0 0,1 0,-1 0,0 0,0 0,0 0,1-1,-1 1,0 0,0 0,0 0,0-1,0 1,0 0,1 0,-1 0,0-1,0 1,0 0,0 0,0-1,0 1,0 0,0 0,0 0,0-1,0 1,0 0,0 0,0-1,0 1,0 0,0 0,-1 0,1-1,0 1,0 0,0 0,0 0,0-1,0 1,-1 0,1 0,0 0,0 0,0-1,0 1,-1 0,1 0,0 0,0 0,0 0,-1 0,1 0,-1 0,-8-3,-1 1,1 0,-1 0,0 1,0 1,0 0,-12 1,5-1,-86 8,2 4,-155 39,86-14,162-36,-31 6,-39 14,74-18,14-3,131-13,141-32,143-51,-390 88,-20 6,-1-1,0-1,0 0,-1 0,1-2,24-12,-38 18,0 0,-1 0,1 0,0 0,0 0,0 0,0 0,-1 0,1 0,0 0,0 0,0 0,-1 0,1 0,0 0,0 0,0 0,0 0,-1 0,1 0,0 0,0 0,0 0,0-1,-1 1,1 0,0 0,0 0,0 0,0 0,0 0,0-1,-1 1,1 0,0 0,0 0,0 0,0 0,0-1,0 1,0 0,0 0,0 0,0-1,0 1,0 0,0 0,0 0,0 0,0-1,0 1,0 0,0 0,0 0,0 0,0-1,0 1,0 0,0 0,0 0,1-1,-15 2,1 1,0 0,0 1,0 1,0-1,-13 8,-83 39,64-28,-343 137,355-147,-4 8,37-20,0-1,0 1,0 0,0 0,0 0,0 0,0 0,1 0,-1 0,0 0,0 0,0 0,0 0,0 0,0 0,0 0,0 0,1 0,-1 0,0 0,0 0,0 0,0 0,0 0,0 0,0 0,0 0,1 0,-1 0,0 1,0-1,0 0,0 0,0 0,0 0,0 0,0 0,0 0,0 0,0 0,0 0,0 0,0 1,0-1,1 0,-1 0,0 0,0 0,0 0,0 0,0 1,29-12,96-37,510-206,-616 246,3 0,-1-2,1 0,33-24,-42 21,-14 6,-1 6,0 0,0 0,-1 1,1-1,0 1,0 0,-1-1,1 1,0 0,0 0,-4 1,-31 3,-1 1,1 2,-70 23,-113 54,181-68,-338 141,290-127,68-25,1 0,0 2,-23 11,41-18,1 0,-1 0,0 0,0 0,0 0,0 0,0 0,0 0,0 0,1 0,-1 1,0-1,0 0,0 0,0 0,0 0,0 0,0 0,0 1,0-1,0 0,1 0,-1 0,0 0,0 0,0 0,0 1,0-1,0 0,0 0,0 0,0 0,0 0,0 1,0-1,-1 0,27-6,517-216,-525 214,-11 6,-1-1,0 0,1 0,-1-1,0 1,0-1,-1 0,1-1,8-9,-13 13,-1 1,0 0,0 0,0-1,0 1,0 0,0 0,0-1,0 1,0 0,0 0,0-1,0 1,0 0,0-1,0 1,0 0,0 0,0-1,0 1,-1 0,1 0,0-1,0 1,0 0,0 0,0 0,-1-1,1 1,0 0,0 0,0 0,-1 0,1-1,0 1,0 0,-1 0,1 0,0 0,0 0,-1 0,1 0,0 0,0 0,-1-1,1 1,0 0,-1 0,1 1,0-1,0 0,-1 0,1 0,0 0,-1 0,-10-1,0 1,-1 1,1-1,0 2,0 0,-18 5,-72 27,64-21,-207 90,548-222,-172 70,75-24,-317 145,100-66,-86 49,-179 74,162-91,51-18,-81 37,140-55,6-4,16-6,31-18,12-17,1 4,115-54,-144 77,0-2,60-44,-81 46,-26 13,-31 11,-153 62,128-43,-139 35,196-59,-31 5,34-9,21-6,-6 4,111-51,188-118,-242 133,1 2,2 3,73-26,-63 38,-42 16</inkml:trace>
+</inkml:ink>
 </file>
 
 <file path=ppt/slideLayouts/slideLayout1.xml><?xml version="1.0" encoding="utf-8"?>
@@ -208,10 +538,9 @@
           <a:lstStyle/>
           <a:p>
             <a:r>
-              <a:rPr lang="en-US" smtClean="0"/>
+              <a:rPr lang="en-US"/>
               <a:t>Click to edit Master title style</a:t>
             </a:r>
-            <a:endParaRPr lang="en-US"/>
           </a:p>
         </p:txBody>
       </p:sp>
@@ -327,10 +656,9 @@
           </a:lstStyle>
           <a:p>
             <a:r>
-              <a:rPr lang="en-US" smtClean="0"/>
+              <a:rPr lang="en-US"/>
               <a:t>Click to edit Master subtitle style</a:t>
             </a:r>
-            <a:endParaRPr lang="en-US"/>
           </a:p>
         </p:txBody>
       </p:sp>
@@ -352,7 +680,7 @@
             <a:fld id="{1D8BD707-D9CF-40AE-B4C6-C98DA3205C09}" type="datetimeFigureOut">
               <a:rPr lang="en-US" smtClean="0"/>
               <a:pPr/>
-              <a:t>8/1/2011</a:t>
+              <a:t>6/7/2021</a:t>
             </a:fld>
             <a:endParaRPr lang="en-US"/>
           </a:p>
@@ -395,7 +723,7 @@
             <a:fld id="{B6F15528-21DE-4FAA-801E-634DDDAF4B2B}" type="slidenum">
               <a:rPr lang="en-US" smtClean="0"/>
               <a:pPr/>
-              <a:t>‹#›</a:t>
+              <a:t>‹nº›</a:t>
             </a:fld>
             <a:endParaRPr lang="en-US"/>
           </a:p>
@@ -442,10 +770,9 @@
           <a:lstStyle/>
           <a:p>
             <a:r>
-              <a:rPr lang="en-US" smtClean="0"/>
+              <a:rPr lang="en-US"/>
               <a:t>Click to edit Master title style</a:t>
             </a:r>
-            <a:endParaRPr lang="en-US"/>
           </a:p>
         </p:txBody>
       </p:sp>
@@ -466,38 +793,37 @@
           <a:p>
             <a:pPr lvl="0"/>
             <a:r>
-              <a:rPr lang="en-US" smtClean="0"/>
+              <a:rPr lang="en-US"/>
               <a:t>Click to edit Master text styles</a:t>
             </a:r>
           </a:p>
           <a:p>
             <a:pPr lvl="1"/>
             <a:r>
-              <a:rPr lang="en-US" smtClean="0"/>
+              <a:rPr lang="en-US"/>
               <a:t>Second level</a:t>
             </a:r>
           </a:p>
           <a:p>
             <a:pPr lvl="2"/>
             <a:r>
-              <a:rPr lang="en-US" smtClean="0"/>
+              <a:rPr lang="en-US"/>
               <a:t>Third level</a:t>
             </a:r>
           </a:p>
           <a:p>
             <a:pPr lvl="3"/>
             <a:r>
-              <a:rPr lang="en-US" smtClean="0"/>
+              <a:rPr lang="en-US"/>
               <a:t>Fourth level</a:t>
             </a:r>
           </a:p>
           <a:p>
             <a:pPr lvl="4"/>
             <a:r>
-              <a:rPr lang="en-US" smtClean="0"/>
+              <a:rPr lang="en-US"/>
               <a:t>Fifth level</a:t>
             </a:r>
-            <a:endParaRPr lang="en-US"/>
           </a:p>
         </p:txBody>
       </p:sp>
@@ -519,7 +845,7 @@
             <a:fld id="{1D8BD707-D9CF-40AE-B4C6-C98DA3205C09}" type="datetimeFigureOut">
               <a:rPr lang="en-US" smtClean="0"/>
               <a:pPr/>
-              <a:t>8/1/2011</a:t>
+              <a:t>6/7/2021</a:t>
             </a:fld>
             <a:endParaRPr lang="en-US"/>
           </a:p>
@@ -562,7 +888,7 @@
             <a:fld id="{B6F15528-21DE-4FAA-801E-634DDDAF4B2B}" type="slidenum">
               <a:rPr lang="en-US" smtClean="0"/>
               <a:pPr/>
-              <a:t>‹#›</a:t>
+              <a:t>‹nº›</a:t>
             </a:fld>
             <a:endParaRPr lang="en-US"/>
           </a:p>
@@ -614,10 +940,9 @@
           <a:lstStyle/>
           <a:p>
             <a:r>
-              <a:rPr lang="en-US" smtClean="0"/>
+              <a:rPr lang="en-US"/>
               <a:t>Click to edit Master title style</a:t>
             </a:r>
-            <a:endParaRPr lang="en-US"/>
           </a:p>
         </p:txBody>
       </p:sp>
@@ -643,38 +968,37 @@
           <a:p>
             <a:pPr lvl="0"/>
             <a:r>
-              <a:rPr lang="en-US" smtClean="0"/>
+              <a:rPr lang="en-US"/>
               <a:t>Click to edit Master text styles</a:t>
             </a:r>
           </a:p>
           <a:p>
             <a:pPr lvl="1"/>
             <a:r>
-              <a:rPr lang="en-US" smtClean="0"/>
+              <a:rPr lang="en-US"/>
               <a:t>Second level</a:t>
             </a:r>
           </a:p>
           <a:p>
             <a:pPr lvl="2"/>
             <a:r>
-              <a:rPr lang="en-US" smtClean="0"/>
+              <a:rPr lang="en-US"/>
               <a:t>Third level</a:t>
             </a:r>
           </a:p>
           <a:p>
             <a:pPr lvl="3"/>
             <a:r>
-              <a:rPr lang="en-US" smtClean="0"/>
+              <a:rPr lang="en-US"/>
               <a:t>Fourth level</a:t>
             </a:r>
           </a:p>
           <a:p>
             <a:pPr lvl="4"/>
             <a:r>
-              <a:rPr lang="en-US" smtClean="0"/>
+              <a:rPr lang="en-US"/>
               <a:t>Fifth level</a:t>
             </a:r>
-            <a:endParaRPr lang="en-US"/>
           </a:p>
         </p:txBody>
       </p:sp>
@@ -696,7 +1020,7 @@
             <a:fld id="{1D8BD707-D9CF-40AE-B4C6-C98DA3205C09}" type="datetimeFigureOut">
               <a:rPr lang="en-US" smtClean="0"/>
               <a:pPr/>
-              <a:t>8/1/2011</a:t>
+              <a:t>6/7/2021</a:t>
             </a:fld>
             <a:endParaRPr lang="en-US"/>
           </a:p>
@@ -739,7 +1063,7 @@
             <a:fld id="{B6F15528-21DE-4FAA-801E-634DDDAF4B2B}" type="slidenum">
               <a:rPr lang="en-US" smtClean="0"/>
               <a:pPr/>
-              <a:t>‹#›</a:t>
+              <a:t>‹nº›</a:t>
             </a:fld>
             <a:endParaRPr lang="en-US"/>
           </a:p>
@@ -786,10 +1110,9 @@
           <a:lstStyle/>
           <a:p>
             <a:r>
-              <a:rPr lang="en-US" smtClean="0"/>
+              <a:rPr lang="en-US"/>
               <a:t>Click to edit Master title style</a:t>
             </a:r>
-            <a:endParaRPr lang="en-US"/>
           </a:p>
         </p:txBody>
       </p:sp>
@@ -810,38 +1133,37 @@
           <a:p>
             <a:pPr lvl="0"/>
             <a:r>
-              <a:rPr lang="en-US" smtClean="0"/>
+              <a:rPr lang="en-US"/>
               <a:t>Click to edit Master text styles</a:t>
             </a:r>
           </a:p>
           <a:p>
             <a:pPr lvl="1"/>
             <a:r>
-              <a:rPr lang="en-US" smtClean="0"/>
+              <a:rPr lang="en-US"/>
               <a:t>Second level</a:t>
             </a:r>
           </a:p>
           <a:p>
             <a:pPr lvl="2"/>
             <a:r>
-              <a:rPr lang="en-US" smtClean="0"/>
+              <a:rPr lang="en-US"/>
               <a:t>Third level</a:t>
             </a:r>
           </a:p>
           <a:p>
             <a:pPr lvl="3"/>
             <a:r>
-              <a:rPr lang="en-US" smtClean="0"/>
+              <a:rPr lang="en-US"/>
               <a:t>Fourth level</a:t>
             </a:r>
           </a:p>
           <a:p>
             <a:pPr lvl="4"/>
             <a:r>
-              <a:rPr lang="en-US" smtClean="0"/>
+              <a:rPr lang="en-US"/>
               <a:t>Fifth level</a:t>
             </a:r>
-            <a:endParaRPr lang="en-US"/>
           </a:p>
         </p:txBody>
       </p:sp>
@@ -863,7 +1185,7 @@
             <a:fld id="{1D8BD707-D9CF-40AE-B4C6-C98DA3205C09}" type="datetimeFigureOut">
               <a:rPr lang="en-US" smtClean="0"/>
               <a:pPr/>
-              <a:t>8/1/2011</a:t>
+              <a:t>6/7/2021</a:t>
             </a:fld>
             <a:endParaRPr lang="en-US"/>
           </a:p>
@@ -906,7 +1228,7 @@
             <a:fld id="{B6F15528-21DE-4FAA-801E-634DDDAF4B2B}" type="slidenum">
               <a:rPr lang="en-US" smtClean="0"/>
               <a:pPr/>
-              <a:t>‹#›</a:t>
+              <a:t>‹nº›</a:t>
             </a:fld>
             <a:endParaRPr lang="en-US"/>
           </a:p>
@@ -962,10 +1284,9 @@
           </a:lstStyle>
           <a:p>
             <a:r>
-              <a:rPr lang="en-US" smtClean="0"/>
+              <a:rPr lang="en-US"/>
               <a:t>Click to edit Master title style</a:t>
             </a:r>
-            <a:endParaRPr lang="en-US"/>
           </a:p>
         </p:txBody>
       </p:sp>
@@ -1082,7 +1403,7 @@
           <a:p>
             <a:pPr lvl="0"/>
             <a:r>
-              <a:rPr lang="en-US" smtClean="0"/>
+              <a:rPr lang="en-US"/>
               <a:t>Click to edit Master text styles</a:t>
             </a:r>
           </a:p>
@@ -1106,7 +1427,7 @@
             <a:fld id="{1D8BD707-D9CF-40AE-B4C6-C98DA3205C09}" type="datetimeFigureOut">
               <a:rPr lang="en-US" smtClean="0"/>
               <a:pPr/>
-              <a:t>8/1/2011</a:t>
+              <a:t>6/7/2021</a:t>
             </a:fld>
             <a:endParaRPr lang="en-US"/>
           </a:p>
@@ -1149,7 +1470,7 @@
             <a:fld id="{B6F15528-21DE-4FAA-801E-634DDDAF4B2B}" type="slidenum">
               <a:rPr lang="en-US" smtClean="0"/>
               <a:pPr/>
-              <a:t>‹#›</a:t>
+              <a:t>‹nº›</a:t>
             </a:fld>
             <a:endParaRPr lang="en-US"/>
           </a:p>
@@ -1196,10 +1517,9 @@
           <a:lstStyle/>
           <a:p>
             <a:r>
-              <a:rPr lang="en-US" smtClean="0"/>
+              <a:rPr lang="en-US"/>
               <a:t>Click to edit Master title style</a:t>
             </a:r>
-            <a:endParaRPr lang="en-US"/>
           </a:p>
         </p:txBody>
       </p:sp>
@@ -1253,38 +1573,37 @@
           <a:p>
             <a:pPr lvl="0"/>
             <a:r>
-              <a:rPr lang="en-US" smtClean="0"/>
+              <a:rPr lang="en-US"/>
               <a:t>Click to edit Master text styles</a:t>
             </a:r>
           </a:p>
           <a:p>
             <a:pPr lvl="1"/>
             <a:r>
-              <a:rPr lang="en-US" smtClean="0"/>
+              <a:rPr lang="en-US"/>
               <a:t>Second level</a:t>
             </a:r>
           </a:p>
           <a:p>
             <a:pPr lvl="2"/>
             <a:r>
-              <a:rPr lang="en-US" smtClean="0"/>
+              <a:rPr lang="en-US"/>
               <a:t>Third level</a:t>
             </a:r>
           </a:p>
           <a:p>
             <a:pPr lvl="3"/>
             <a:r>
-              <a:rPr lang="en-US" smtClean="0"/>
+              <a:rPr lang="en-US"/>
               <a:t>Fourth level</a:t>
             </a:r>
           </a:p>
           <a:p>
             <a:pPr lvl="4"/>
             <a:r>
-              <a:rPr lang="en-US" smtClean="0"/>
+              <a:rPr lang="en-US"/>
               <a:t>Fifth level</a:t>
             </a:r>
-            <a:endParaRPr lang="en-US"/>
           </a:p>
         </p:txBody>
       </p:sp>
@@ -1338,38 +1657,37 @@
           <a:p>
             <a:pPr lvl="0"/>
             <a:r>
-              <a:rPr lang="en-US" smtClean="0"/>
+              <a:rPr lang="en-US"/>
               <a:t>Click to edit Master text styles</a:t>
             </a:r>
           </a:p>
           <a:p>
             <a:pPr lvl="1"/>
             <a:r>
-              <a:rPr lang="en-US" smtClean="0"/>
+              <a:rPr lang="en-US"/>
               <a:t>Second level</a:t>
             </a:r>
           </a:p>
           <a:p>
             <a:pPr lvl="2"/>
             <a:r>
-              <a:rPr lang="en-US" smtClean="0"/>
+              <a:rPr lang="en-US"/>
               <a:t>Third level</a:t>
             </a:r>
           </a:p>
           <a:p>
             <a:pPr lvl="3"/>
             <a:r>
-              <a:rPr lang="en-US" smtClean="0"/>
+              <a:rPr lang="en-US"/>
               <a:t>Fourth level</a:t>
             </a:r>
           </a:p>
           <a:p>
             <a:pPr lvl="4"/>
             <a:r>
-              <a:rPr lang="en-US" smtClean="0"/>
+              <a:rPr lang="en-US"/>
               <a:t>Fifth level</a:t>
             </a:r>
-            <a:endParaRPr lang="en-US"/>
           </a:p>
         </p:txBody>
       </p:sp>
@@ -1391,7 +1709,7 @@
             <a:fld id="{1D8BD707-D9CF-40AE-B4C6-C98DA3205C09}" type="datetimeFigureOut">
               <a:rPr lang="en-US" smtClean="0"/>
               <a:pPr/>
-              <a:t>8/1/2011</a:t>
+              <a:t>6/7/2021</a:t>
             </a:fld>
             <a:endParaRPr lang="en-US"/>
           </a:p>
@@ -1434,7 +1752,7 @@
             <a:fld id="{B6F15528-21DE-4FAA-801E-634DDDAF4B2B}" type="slidenum">
               <a:rPr lang="en-US" smtClean="0"/>
               <a:pPr/>
-              <a:t>‹#›</a:t>
+              <a:t>‹nº›</a:t>
             </a:fld>
             <a:endParaRPr lang="en-US"/>
           </a:p>
@@ -1485,10 +1803,9 @@
           </a:lstStyle>
           <a:p>
             <a:r>
-              <a:rPr lang="en-US" smtClean="0"/>
+              <a:rPr lang="en-US"/>
               <a:t>Click to edit Master title style</a:t>
             </a:r>
-            <a:endParaRPr lang="en-US"/>
           </a:p>
         </p:txBody>
       </p:sp>
@@ -1551,7 +1868,7 @@
           <a:p>
             <a:pPr lvl="0"/>
             <a:r>
-              <a:rPr lang="en-US" smtClean="0"/>
+              <a:rPr lang="en-US"/>
               <a:t>Click to edit Master text styles</a:t>
             </a:r>
           </a:p>
@@ -1607,38 +1924,37 @@
           <a:p>
             <a:pPr lvl="0"/>
             <a:r>
-              <a:rPr lang="en-US" smtClean="0"/>
+              <a:rPr lang="en-US"/>
               <a:t>Click to edit Master text styles</a:t>
             </a:r>
           </a:p>
           <a:p>
             <a:pPr lvl="1"/>
             <a:r>
-              <a:rPr lang="en-US" smtClean="0"/>
+              <a:rPr lang="en-US"/>
               <a:t>Second level</a:t>
             </a:r>
           </a:p>
           <a:p>
             <a:pPr lvl="2"/>
             <a:r>
-              <a:rPr lang="en-US" smtClean="0"/>
+              <a:rPr lang="en-US"/>
               <a:t>Third level</a:t>
             </a:r>
           </a:p>
           <a:p>
             <a:pPr lvl="3"/>
             <a:r>
-              <a:rPr lang="en-US" smtClean="0"/>
+              <a:rPr lang="en-US"/>
               <a:t>Fourth level</a:t>
             </a:r>
           </a:p>
           <a:p>
             <a:pPr lvl="4"/>
             <a:r>
-              <a:rPr lang="en-US" smtClean="0"/>
+              <a:rPr lang="en-US"/>
               <a:t>Fifth level</a:t>
             </a:r>
-            <a:endParaRPr lang="en-US"/>
           </a:p>
         </p:txBody>
       </p:sp>
@@ -1701,7 +2017,7 @@
           <a:p>
             <a:pPr lvl="0"/>
             <a:r>
-              <a:rPr lang="en-US" smtClean="0"/>
+              <a:rPr lang="en-US"/>
               <a:t>Click to edit Master text styles</a:t>
             </a:r>
           </a:p>
@@ -1757,38 +2073,37 @@
           <a:p>
             <a:pPr lvl="0"/>
             <a:r>
-              <a:rPr lang="en-US" smtClean="0"/>
+              <a:rPr lang="en-US"/>
               <a:t>Click to edit Master text styles</a:t>
             </a:r>
           </a:p>
           <a:p>
             <a:pPr lvl="1"/>
             <a:r>
-              <a:rPr lang="en-US" smtClean="0"/>
+              <a:rPr lang="en-US"/>
               <a:t>Second level</a:t>
             </a:r>
           </a:p>
           <a:p>
             <a:pPr lvl="2"/>
             <a:r>
-              <a:rPr lang="en-US" smtClean="0"/>
+              <a:rPr lang="en-US"/>
               <a:t>Third level</a:t>
             </a:r>
           </a:p>
           <a:p>
             <a:pPr lvl="3"/>
             <a:r>
-              <a:rPr lang="en-US" smtClean="0"/>
+              <a:rPr lang="en-US"/>
               <a:t>Fourth level</a:t>
             </a:r>
           </a:p>
           <a:p>
             <a:pPr lvl="4"/>
             <a:r>
-              <a:rPr lang="en-US" smtClean="0"/>
+              <a:rPr lang="en-US"/>
               <a:t>Fifth level</a:t>
             </a:r>
-            <a:endParaRPr lang="en-US"/>
           </a:p>
         </p:txBody>
       </p:sp>
@@ -1810,7 +2125,7 @@
             <a:fld id="{1D8BD707-D9CF-40AE-B4C6-C98DA3205C09}" type="datetimeFigureOut">
               <a:rPr lang="en-US" smtClean="0"/>
               <a:pPr/>
-              <a:t>8/1/2011</a:t>
+              <a:t>6/7/2021</a:t>
             </a:fld>
             <a:endParaRPr lang="en-US"/>
           </a:p>
@@ -1853,7 +2168,7 @@
             <a:fld id="{B6F15528-21DE-4FAA-801E-634DDDAF4B2B}" type="slidenum">
               <a:rPr lang="en-US" smtClean="0"/>
               <a:pPr/>
-              <a:t>‹#›</a:t>
+              <a:t>‹nº›</a:t>
             </a:fld>
             <a:endParaRPr lang="en-US"/>
           </a:p>
@@ -1900,10 +2215,9 @@
           <a:lstStyle/>
           <a:p>
             <a:r>
-              <a:rPr lang="en-US" smtClean="0"/>
+              <a:rPr lang="en-US"/>
               <a:t>Click to edit Master title style</a:t>
             </a:r>
-            <a:endParaRPr lang="en-US"/>
           </a:p>
         </p:txBody>
       </p:sp>
@@ -1925,7 +2239,7 @@
             <a:fld id="{1D8BD707-D9CF-40AE-B4C6-C98DA3205C09}" type="datetimeFigureOut">
               <a:rPr lang="en-US" smtClean="0"/>
               <a:pPr/>
-              <a:t>8/1/2011</a:t>
+              <a:t>6/7/2021</a:t>
             </a:fld>
             <a:endParaRPr lang="en-US"/>
           </a:p>
@@ -1968,7 +2282,7 @@
             <a:fld id="{B6F15528-21DE-4FAA-801E-634DDDAF4B2B}" type="slidenum">
               <a:rPr lang="en-US" smtClean="0"/>
               <a:pPr/>
-              <a:t>‹#›</a:t>
+              <a:t>‹nº›</a:t>
             </a:fld>
             <a:endParaRPr lang="en-US"/>
           </a:p>
@@ -2017,7 +2331,7 @@
             <a:fld id="{1D8BD707-D9CF-40AE-B4C6-C98DA3205C09}" type="datetimeFigureOut">
               <a:rPr lang="en-US" smtClean="0"/>
               <a:pPr/>
-              <a:t>8/1/2011</a:t>
+              <a:t>6/7/2021</a:t>
             </a:fld>
             <a:endParaRPr lang="en-US"/>
           </a:p>
@@ -2060,7 +2374,7 @@
             <a:fld id="{B6F15528-21DE-4FAA-801E-634DDDAF4B2B}" type="slidenum">
               <a:rPr lang="en-US" smtClean="0"/>
               <a:pPr/>
-              <a:t>‹#›</a:t>
+              <a:t>‹nº›</a:t>
             </a:fld>
             <a:endParaRPr lang="en-US"/>
           </a:p>
@@ -2116,10 +2430,9 @@
           </a:lstStyle>
           <a:p>
             <a:r>
-              <a:rPr lang="en-US" smtClean="0"/>
+              <a:rPr lang="en-US"/>
               <a:t>Click to edit Master title style</a:t>
             </a:r>
-            <a:endParaRPr lang="en-US"/>
           </a:p>
         </p:txBody>
       </p:sp>
@@ -2173,38 +2486,37 @@
           <a:p>
             <a:pPr lvl="0"/>
             <a:r>
-              <a:rPr lang="en-US" smtClean="0"/>
+              <a:rPr lang="en-US"/>
               <a:t>Click to edit Master text styles</a:t>
             </a:r>
           </a:p>
           <a:p>
             <a:pPr lvl="1"/>
             <a:r>
-              <a:rPr lang="en-US" smtClean="0"/>
+              <a:rPr lang="en-US"/>
               <a:t>Second level</a:t>
             </a:r>
           </a:p>
           <a:p>
             <a:pPr lvl="2"/>
             <a:r>
-              <a:rPr lang="en-US" smtClean="0"/>
+              <a:rPr lang="en-US"/>
               <a:t>Third level</a:t>
             </a:r>
           </a:p>
           <a:p>
             <a:pPr lvl="3"/>
             <a:r>
-              <a:rPr lang="en-US" smtClean="0"/>
+              <a:rPr lang="en-US"/>
               <a:t>Fourth level</a:t>
             </a:r>
           </a:p>
           <a:p>
             <a:pPr lvl="4"/>
             <a:r>
-              <a:rPr lang="en-US" smtClean="0"/>
+              <a:rPr lang="en-US"/>
               <a:t>Fifth level</a:t>
             </a:r>
-            <a:endParaRPr lang="en-US"/>
           </a:p>
         </p:txBody>
       </p:sp>
@@ -2267,7 +2579,7 @@
           <a:p>
             <a:pPr lvl="0"/>
             <a:r>
-              <a:rPr lang="en-US" smtClean="0"/>
+              <a:rPr lang="en-US"/>
               <a:t>Click to edit Master text styles</a:t>
             </a:r>
           </a:p>
@@ -2291,7 +2603,7 @@
             <a:fld id="{1D8BD707-D9CF-40AE-B4C6-C98DA3205C09}" type="datetimeFigureOut">
               <a:rPr lang="en-US" smtClean="0"/>
               <a:pPr/>
-              <a:t>8/1/2011</a:t>
+              <a:t>6/7/2021</a:t>
             </a:fld>
             <a:endParaRPr lang="en-US"/>
           </a:p>
@@ -2334,7 +2646,7 @@
             <a:fld id="{B6F15528-21DE-4FAA-801E-634DDDAF4B2B}" type="slidenum">
               <a:rPr lang="en-US" smtClean="0"/>
               <a:pPr/>
-              <a:t>‹#›</a:t>
+              <a:t>‹nº›</a:t>
             </a:fld>
             <a:endParaRPr lang="en-US"/>
           </a:p>
@@ -2390,10 +2702,9 @@
           </a:lstStyle>
           <a:p>
             <a:r>
-              <a:rPr lang="en-US" smtClean="0"/>
+              <a:rPr lang="en-US"/>
               <a:t>Click to edit Master title style</a:t>
             </a:r>
-            <a:endParaRPr lang="en-US"/>
           </a:p>
         </p:txBody>
       </p:sp>
@@ -2517,7 +2828,7 @@
           <a:p>
             <a:pPr lvl="0"/>
             <a:r>
-              <a:rPr lang="en-US" smtClean="0"/>
+              <a:rPr lang="en-US"/>
               <a:t>Click to edit Master text styles</a:t>
             </a:r>
           </a:p>
@@ -2541,7 +2852,7 @@
             <a:fld id="{1D8BD707-D9CF-40AE-B4C6-C98DA3205C09}" type="datetimeFigureOut">
               <a:rPr lang="en-US" smtClean="0"/>
               <a:pPr/>
-              <a:t>8/1/2011</a:t>
+              <a:t>6/7/2021</a:t>
             </a:fld>
             <a:endParaRPr lang="en-US"/>
           </a:p>
@@ -2584,7 +2895,7 @@
             <a:fld id="{B6F15528-21DE-4FAA-801E-634DDDAF4B2B}" type="slidenum">
               <a:rPr lang="en-US" smtClean="0"/>
               <a:pPr/>
-              <a:t>‹#›</a:t>
+              <a:t>‹nº›</a:t>
             </a:fld>
             <a:endParaRPr lang="en-US"/>
           </a:p>
@@ -2646,10 +2957,9 @@
           <a:lstStyle/>
           <a:p>
             <a:r>
-              <a:rPr lang="en-US" smtClean="0"/>
+              <a:rPr lang="en-US"/>
               <a:t>Click to edit Master title style</a:t>
             </a:r>
-            <a:endParaRPr lang="en-US"/>
           </a:p>
         </p:txBody>
       </p:sp>
@@ -2680,38 +2990,37 @@
           <a:p>
             <a:pPr lvl="0"/>
             <a:r>
-              <a:rPr lang="en-US" smtClean="0"/>
+              <a:rPr lang="en-US"/>
               <a:t>Click to edit Master text styles</a:t>
             </a:r>
           </a:p>
           <a:p>
             <a:pPr lvl="1"/>
             <a:r>
-              <a:rPr lang="en-US" smtClean="0"/>
+              <a:rPr lang="en-US"/>
               <a:t>Second level</a:t>
             </a:r>
           </a:p>
           <a:p>
             <a:pPr lvl="2"/>
             <a:r>
-              <a:rPr lang="en-US" smtClean="0"/>
+              <a:rPr lang="en-US"/>
               <a:t>Third level</a:t>
             </a:r>
           </a:p>
           <a:p>
             <a:pPr lvl="3"/>
             <a:r>
-              <a:rPr lang="en-US" smtClean="0"/>
+              <a:rPr lang="en-US"/>
               <a:t>Fourth level</a:t>
             </a:r>
           </a:p>
           <a:p>
             <a:pPr lvl="4"/>
             <a:r>
-              <a:rPr lang="en-US" smtClean="0"/>
+              <a:rPr lang="en-US"/>
               <a:t>Fifth level</a:t>
             </a:r>
-            <a:endParaRPr lang="en-US"/>
           </a:p>
         </p:txBody>
       </p:sp>
@@ -2751,7 +3060,7 @@
             <a:fld id="{1D8BD707-D9CF-40AE-B4C6-C98DA3205C09}" type="datetimeFigureOut">
               <a:rPr lang="en-US" smtClean="0"/>
               <a:pPr/>
-              <a:t>8/1/2011</a:t>
+              <a:t>6/7/2021</a:t>
             </a:fld>
             <a:endParaRPr lang="en-US"/>
           </a:p>
@@ -2830,7 +3139,7 @@
             <a:fld id="{B6F15528-21DE-4FAA-801E-634DDDAF4B2B}" type="slidenum">
               <a:rPr lang="en-US" smtClean="0"/>
               <a:pPr/>
-              <a:t>‹#›</a:t>
+              <a:t>‹nº›</a:t>
             </a:fld>
             <a:endParaRPr lang="en-US"/>
           </a:p>
@@ -3106,13 +3415,14 @@
 </file>
 
 <file path=ppt/slides/slide1.xml><?xml version="1.0" encoding="utf-8"?>
-<p:sld xmlns:p="http://schemas.openxmlformats.org/presentationml/2006/main" xmlns:a="http://schemas.openxmlformats.org/drawingml/2006/main">
+<p:sld xmlns:a="http://schemas.openxmlformats.org/drawingml/2006/main" xmlns:r="http://schemas.openxmlformats.org/officeDocument/2006/relationships" xmlns:p="http://schemas.openxmlformats.org/presentationml/2006/main">
   <p:cSld>
     <p:bg>
       <p:bgPr>
         <a:solidFill>
           <a:srgbClr val="0F2B34"/>
         </a:solidFill>
+        <a:effectLst/>
       </p:bgPr>
     </p:bg>
     <p:spTree>
@@ -3131,12 +3441,12 @@
       </p:grpSpPr>
       <p:grpSp>
         <p:nvGrpSpPr>
-          <p:cNvPr name="Group 2" id="2"/>
+          <p:cNvPr id="2" name="Group 2"/>
           <p:cNvGrpSpPr/>
           <p:nvPr/>
         </p:nvGrpSpPr>
         <p:grpSpPr>
-          <a:xfrm rot="0">
+          <a:xfrm>
             <a:off x="1282994" y="3048102"/>
             <a:ext cx="15722011" cy="4190797"/>
             <a:chOff x="0" y="0"/>
@@ -3145,12 +3455,12 @@
         </p:grpSpPr>
         <p:sp>
           <p:nvSpPr>
-            <p:cNvPr name="TextBox 3" id="3"/>
-            <p:cNvSpPr txBox="true"/>
+            <p:cNvPr id="3" name="TextBox 3"/>
+            <p:cNvSpPr txBox="1"/>
             <p:nvPr/>
           </p:nvSpPr>
           <p:spPr>
-            <a:xfrm rot="0">
+            <a:xfrm>
               <a:off x="0" y="-19050"/>
               <a:ext cx="20962681" cy="4303081"/>
             </a:xfrm>
@@ -3159,7 +3469,7 @@
             </a:prstGeom>
           </p:spPr>
           <p:txBody>
-            <a:bodyPr anchor="t" rtlCol="false" tIns="0" lIns="0" bIns="0" rIns="0">
+            <a:bodyPr lIns="0" tIns="0" rIns="0" bIns="0" rtlCol="0" anchor="t">
               <a:spAutoFit/>
             </a:bodyPr>
             <a:lstStyle/>
@@ -3170,7 +3480,7 @@
                 </a:lnSpc>
               </a:pPr>
               <a:r>
-                <a:rPr lang="en-US" sz="10999">
+                <a:rPr lang="en-US" sz="10999" dirty="0">
                   <a:solidFill>
                     <a:srgbClr val="FFFFFF"/>
                   </a:solidFill>
@@ -3183,12 +3493,12 @@
         </p:sp>
         <p:sp>
           <p:nvSpPr>
-            <p:cNvPr name="TextBox 4" id="4"/>
-            <p:cNvSpPr txBox="true"/>
+            <p:cNvPr id="4" name="TextBox 4"/>
+            <p:cNvSpPr txBox="1"/>
             <p:nvPr/>
           </p:nvSpPr>
           <p:spPr>
-            <a:xfrm rot="0">
+            <a:xfrm>
               <a:off x="0" y="4955914"/>
               <a:ext cx="20962681" cy="631815"/>
             </a:xfrm>
@@ -3197,12 +3507,12 @@
             </a:prstGeom>
           </p:spPr>
           <p:txBody>
-            <a:bodyPr anchor="t" rtlCol="false" tIns="0" lIns="0" bIns="0" rIns="0">
+            <a:bodyPr lIns="0" tIns="0" rIns="0" bIns="0" rtlCol="0" anchor="t">
               <a:spAutoFit/>
             </a:bodyPr>
             <a:lstStyle/>
             <a:p>
-              <a:pPr algn="ctr" marL="0" indent="0" lvl="0">
+              <a:pPr marL="0" lvl="0" indent="0" algn="ctr">
                 <a:lnSpc>
                   <a:spcPts val="3500"/>
                 </a:lnSpc>
@@ -3225,12 +3535,12 @@
       </p:grpSp>
       <p:sp>
         <p:nvSpPr>
-          <p:cNvPr name="TextBox 5" id="5"/>
-          <p:cNvSpPr txBox="true"/>
+          <p:cNvPr id="5" name="TextBox 5"/>
+          <p:cNvSpPr txBox="1"/>
           <p:nvPr/>
         </p:nvSpPr>
         <p:spPr>
-          <a:xfrm rot="0">
+          <a:xfrm>
             <a:off x="13156037" y="9191625"/>
             <a:ext cx="4543425" cy="584835"/>
           </a:xfrm>
@@ -3239,7 +3549,7 @@
           </a:prstGeom>
         </p:spPr>
         <p:txBody>
-          <a:bodyPr anchor="t" rtlCol="false" tIns="0" lIns="0" bIns="0" rIns="0">
+          <a:bodyPr lIns="0" tIns="0" rIns="0" bIns="0" rtlCol="0" anchor="t">
             <a:spAutoFit/>
           </a:bodyPr>
           <a:lstStyle/>
@@ -3270,13 +3580,14 @@
 </file>
 
 <file path=ppt/slides/slide10.xml><?xml version="1.0" encoding="utf-8"?>
-<p:sld xmlns:p="http://schemas.openxmlformats.org/presentationml/2006/main" xmlns:a="http://schemas.openxmlformats.org/drawingml/2006/main">
+<p:sld xmlns:a="http://schemas.openxmlformats.org/drawingml/2006/main" xmlns:r="http://schemas.openxmlformats.org/officeDocument/2006/relationships" xmlns:p="http://schemas.openxmlformats.org/presentationml/2006/main">
   <p:cSld>
     <p:bg>
       <p:bgPr>
         <a:solidFill>
           <a:srgbClr val="0F2B34"/>
         </a:solidFill>
+        <a:effectLst/>
       </p:bgPr>
     </p:bg>
     <p:spTree>
@@ -3295,12 +3606,12 @@
       </p:grpSpPr>
       <p:sp>
         <p:nvSpPr>
-          <p:cNvPr name="TextBox 2" id="2"/>
-          <p:cNvSpPr txBox="true"/>
+          <p:cNvPr id="2" name="TextBox 2"/>
+          <p:cNvSpPr txBox="1"/>
           <p:nvPr/>
         </p:nvSpPr>
         <p:spPr>
-          <a:xfrm rot="0">
+          <a:xfrm>
             <a:off x="7138988" y="4730115"/>
             <a:ext cx="4010025" cy="741045"/>
           </a:xfrm>
@@ -3309,7 +3620,7 @@
           </a:prstGeom>
         </p:spPr>
         <p:txBody>
-          <a:bodyPr anchor="t" rtlCol="false" tIns="0" lIns="0" bIns="0" rIns="0">
+          <a:bodyPr lIns="0" tIns="0" rIns="0" bIns="0" rtlCol="0" anchor="t">
             <a:spAutoFit/>
           </a:bodyPr>
           <a:lstStyle/>
@@ -3340,13 +3651,14 @@
 </file>
 
 <file path=ppt/slides/slide2.xml><?xml version="1.0" encoding="utf-8"?>
-<p:sld xmlns:p="http://schemas.openxmlformats.org/presentationml/2006/main" xmlns:a="http://schemas.openxmlformats.org/drawingml/2006/main">
+<p:sld xmlns:a="http://schemas.openxmlformats.org/drawingml/2006/main" xmlns:r="http://schemas.openxmlformats.org/officeDocument/2006/relationships" xmlns:p="http://schemas.openxmlformats.org/presentationml/2006/main">
   <p:cSld>
     <p:bg>
       <p:bgPr>
         <a:solidFill>
           <a:srgbClr val="0F2B34"/>
         </a:solidFill>
+        <a:effectLst/>
       </p:bgPr>
     </p:bg>
     <p:spTree>
@@ -3365,12 +3677,12 @@
       </p:grpSpPr>
       <p:sp>
         <p:nvSpPr>
-          <p:cNvPr name="TextBox 2" id="2"/>
-          <p:cNvSpPr txBox="true"/>
+          <p:cNvPr id="2" name="TextBox 2"/>
+          <p:cNvSpPr txBox="1"/>
           <p:nvPr/>
         </p:nvSpPr>
         <p:spPr>
-          <a:xfrm rot="0">
+          <a:xfrm>
             <a:off x="2197603" y="2773654"/>
             <a:ext cx="13892794" cy="1162020"/>
           </a:xfrm>
@@ -3379,7 +3691,7 @@
           </a:prstGeom>
         </p:spPr>
         <p:txBody>
-          <a:bodyPr anchor="t" rtlCol="false" tIns="0" lIns="0" bIns="0" rIns="0">
+          <a:bodyPr lIns="0" tIns="0" rIns="0" bIns="0" rtlCol="0" anchor="t">
             <a:spAutoFit/>
           </a:bodyPr>
           <a:lstStyle/>
@@ -3403,12 +3715,12 @@
       </p:sp>
       <p:grpSp>
         <p:nvGrpSpPr>
-          <p:cNvPr name="Group 3" id="3"/>
+          <p:cNvPr id="3" name="Group 3"/>
           <p:cNvGrpSpPr/>
           <p:nvPr/>
         </p:nvGrpSpPr>
         <p:grpSpPr>
-          <a:xfrm rot="0">
+          <a:xfrm>
             <a:off x="1199604" y="5877836"/>
             <a:ext cx="881343" cy="881343"/>
             <a:chOff x="0" y="0"/>
@@ -3417,14 +3729,14 @@
         </p:grpSpPr>
         <p:grpSp>
           <p:nvGrpSpPr>
-            <p:cNvPr name="Group 4" id="4"/>
+            <p:cNvPr id="4" name="Group 4"/>
             <p:cNvGrpSpPr>
-              <a:grpSpLocks noChangeAspect="true"/>
+              <a:grpSpLocks noChangeAspect="1"/>
             </p:cNvGrpSpPr>
             <p:nvPr/>
           </p:nvGrpSpPr>
           <p:grpSpPr>
-            <a:xfrm rot="0">
+            <a:xfrm>
               <a:off x="0" y="0"/>
               <a:ext cx="1175123" cy="1175123"/>
               <a:chOff x="-2540" y="-2540"/>
@@ -3433,7 +3745,7 @@
           </p:grpSpPr>
           <p:sp>
             <p:nvSpPr>
-              <p:cNvPr name="Freeform 5" id="5"/>
+              <p:cNvPr id="5" name="Freeform 5"/>
               <p:cNvSpPr/>
               <p:nvPr/>
             </p:nvSpPr>
@@ -3447,9 +3759,9 @@
                 <a:gdLst/>
                 <a:ahLst/>
                 <a:cxnLst/>
-                <a:rect r="r" b="b" t="t" l="l"/>
+                <a:rect l="l" t="t" r="r" b="b"/>
                 <a:pathLst>
-                  <a:path h="6355080" w="6355080">
+                  <a:path w="6355080" h="6355080">
                     <a:moveTo>
                       <a:pt x="3177540" y="6355080"/>
                     </a:moveTo>
@@ -3549,12 +3861,12 @@
         </p:grpSp>
         <p:sp>
           <p:nvSpPr>
-            <p:cNvPr name="TextBox 6" id="6"/>
-            <p:cNvSpPr txBox="true"/>
+            <p:cNvPr id="6" name="TextBox 6"/>
+            <p:cNvSpPr txBox="1"/>
             <p:nvPr/>
           </p:nvSpPr>
           <p:spPr>
-            <a:xfrm rot="0">
+            <a:xfrm>
               <a:off x="366298" y="330796"/>
               <a:ext cx="442528" cy="532581"/>
             </a:xfrm>
@@ -3563,12 +3875,12 @@
             </a:prstGeom>
           </p:spPr>
           <p:txBody>
-            <a:bodyPr anchor="t" rtlCol="false" tIns="0" lIns="0" bIns="0" rIns="0">
+            <a:bodyPr lIns="0" tIns="0" rIns="0" bIns="0" rtlCol="0" anchor="t">
               <a:spAutoFit/>
             </a:bodyPr>
             <a:lstStyle/>
             <a:p>
-              <a:pPr algn="ctr" marL="0" indent="0" lvl="0">
+              <a:pPr marL="0" lvl="0" indent="0" algn="ctr">
                 <a:lnSpc>
                   <a:spcPts val="2612"/>
                 </a:lnSpc>
@@ -3591,12 +3903,12 @@
       </p:grpSp>
       <p:sp>
         <p:nvSpPr>
-          <p:cNvPr name="TextBox 7" id="7"/>
-          <p:cNvSpPr txBox="true"/>
+          <p:cNvPr id="7" name="TextBox 7"/>
+          <p:cNvSpPr txBox="1"/>
           <p:nvPr/>
         </p:nvSpPr>
         <p:spPr>
-          <a:xfrm rot="0">
+          <a:xfrm>
             <a:off x="2557196" y="6053748"/>
             <a:ext cx="4190940" cy="424744"/>
           </a:xfrm>
@@ -3605,12 +3917,12 @@
           </a:prstGeom>
         </p:spPr>
         <p:txBody>
-          <a:bodyPr anchor="t" rtlCol="false" tIns="0" lIns="0" bIns="0" rIns="0">
+          <a:bodyPr lIns="0" tIns="0" rIns="0" bIns="0" rtlCol="0" anchor="t">
             <a:spAutoFit/>
           </a:bodyPr>
           <a:lstStyle/>
           <a:p>
-            <a:pPr marL="0" indent="0" lvl="0">
+            <a:pPr marL="0" lvl="0" indent="0">
               <a:lnSpc>
                 <a:spcPts val="2940"/>
               </a:lnSpc>
@@ -3632,12 +3944,12 @@
       </p:sp>
       <p:grpSp>
         <p:nvGrpSpPr>
-          <p:cNvPr name="Group 8" id="8"/>
+          <p:cNvPr id="8" name="Group 8"/>
           <p:cNvGrpSpPr/>
           <p:nvPr/>
         </p:nvGrpSpPr>
         <p:grpSpPr>
-          <a:xfrm rot="0">
+          <a:xfrm>
             <a:off x="1199604" y="7755948"/>
             <a:ext cx="881343" cy="881343"/>
             <a:chOff x="0" y="0"/>
@@ -3646,14 +3958,14 @@
         </p:grpSpPr>
         <p:grpSp>
           <p:nvGrpSpPr>
-            <p:cNvPr name="Group 9" id="9"/>
+            <p:cNvPr id="9" name="Group 9"/>
             <p:cNvGrpSpPr>
-              <a:grpSpLocks noChangeAspect="true"/>
+              <a:grpSpLocks noChangeAspect="1"/>
             </p:cNvGrpSpPr>
             <p:nvPr/>
           </p:nvGrpSpPr>
           <p:grpSpPr>
-            <a:xfrm rot="0">
+            <a:xfrm>
               <a:off x="0" y="0"/>
               <a:ext cx="1175123" cy="1175123"/>
               <a:chOff x="-2540" y="-2540"/>
@@ -3662,7 +3974,7 @@
           </p:grpSpPr>
           <p:sp>
             <p:nvSpPr>
-              <p:cNvPr name="Freeform 10" id="10"/>
+              <p:cNvPr id="10" name="Freeform 10"/>
               <p:cNvSpPr/>
               <p:nvPr/>
             </p:nvSpPr>
@@ -3676,9 +3988,9 @@
                 <a:gdLst/>
                 <a:ahLst/>
                 <a:cxnLst/>
-                <a:rect r="r" b="b" t="t" l="l"/>
+                <a:rect l="l" t="t" r="r" b="b"/>
                 <a:pathLst>
-                  <a:path h="6355080" w="6355080">
+                  <a:path w="6355080" h="6355080">
                     <a:moveTo>
                       <a:pt x="3177540" y="6355080"/>
                     </a:moveTo>
@@ -3778,12 +4090,12 @@
         </p:grpSp>
         <p:sp>
           <p:nvSpPr>
-            <p:cNvPr name="TextBox 11" id="11"/>
-            <p:cNvSpPr txBox="true"/>
+            <p:cNvPr id="11" name="TextBox 11"/>
+            <p:cNvSpPr txBox="1"/>
             <p:nvPr/>
           </p:nvSpPr>
           <p:spPr>
-            <a:xfrm rot="0">
+            <a:xfrm>
               <a:off x="366298" y="330796"/>
               <a:ext cx="442528" cy="532581"/>
             </a:xfrm>
@@ -3792,12 +4104,12 @@
             </a:prstGeom>
           </p:spPr>
           <p:txBody>
-            <a:bodyPr anchor="t" rtlCol="false" tIns="0" lIns="0" bIns="0" rIns="0">
+            <a:bodyPr lIns="0" tIns="0" rIns="0" bIns="0" rtlCol="0" anchor="t">
               <a:spAutoFit/>
             </a:bodyPr>
             <a:lstStyle/>
             <a:p>
-              <a:pPr algn="ctr" marL="0" indent="0" lvl="0">
+              <a:pPr marL="0" lvl="0" indent="0" algn="ctr">
                 <a:lnSpc>
                   <a:spcPts val="2612"/>
                 </a:lnSpc>
@@ -3820,12 +4132,12 @@
       </p:grpSp>
       <p:sp>
         <p:nvSpPr>
-          <p:cNvPr name="TextBox 12" id="12"/>
-          <p:cNvSpPr txBox="true"/>
+          <p:cNvPr id="12" name="TextBox 12"/>
+          <p:cNvSpPr txBox="1"/>
           <p:nvPr/>
         </p:nvSpPr>
         <p:spPr>
-          <a:xfrm rot="0">
+          <a:xfrm>
             <a:off x="2557196" y="7931859"/>
             <a:ext cx="4190940" cy="424744"/>
           </a:xfrm>
@@ -3834,12 +4146,12 @@
           </a:prstGeom>
         </p:spPr>
         <p:txBody>
-          <a:bodyPr anchor="t" rtlCol="false" tIns="0" lIns="0" bIns="0" rIns="0">
+          <a:bodyPr lIns="0" tIns="0" rIns="0" bIns="0" rtlCol="0" anchor="t">
             <a:spAutoFit/>
           </a:bodyPr>
           <a:lstStyle/>
           <a:p>
-            <a:pPr marL="0" indent="0" lvl="0">
+            <a:pPr marL="0" lvl="0" indent="0">
               <a:lnSpc>
                 <a:spcPts val="2940"/>
               </a:lnSpc>
@@ -3861,12 +4173,12 @@
       </p:sp>
       <p:grpSp>
         <p:nvGrpSpPr>
-          <p:cNvPr name="Group 13" id="13"/>
+          <p:cNvPr id="13" name="Group 13"/>
           <p:cNvGrpSpPr/>
           <p:nvPr/>
         </p:nvGrpSpPr>
         <p:grpSpPr>
-          <a:xfrm rot="0">
+          <a:xfrm>
             <a:off x="7682424" y="5877836"/>
             <a:ext cx="881343" cy="881343"/>
             <a:chOff x="0" y="0"/>
@@ -3875,14 +4187,14 @@
         </p:grpSpPr>
         <p:grpSp>
           <p:nvGrpSpPr>
-            <p:cNvPr name="Group 14" id="14"/>
+            <p:cNvPr id="14" name="Group 14"/>
             <p:cNvGrpSpPr>
-              <a:grpSpLocks noChangeAspect="true"/>
+              <a:grpSpLocks noChangeAspect="1"/>
             </p:cNvGrpSpPr>
             <p:nvPr/>
           </p:nvGrpSpPr>
           <p:grpSpPr>
-            <a:xfrm rot="0">
+            <a:xfrm>
               <a:off x="0" y="0"/>
               <a:ext cx="1175123" cy="1175123"/>
               <a:chOff x="-2540" y="-2540"/>
@@ -3891,7 +4203,7 @@
           </p:grpSpPr>
           <p:sp>
             <p:nvSpPr>
-              <p:cNvPr name="Freeform 15" id="15"/>
+              <p:cNvPr id="15" name="Freeform 15"/>
               <p:cNvSpPr/>
               <p:nvPr/>
             </p:nvSpPr>
@@ -3905,9 +4217,9 @@
                 <a:gdLst/>
                 <a:ahLst/>
                 <a:cxnLst/>
-                <a:rect r="r" b="b" t="t" l="l"/>
+                <a:rect l="l" t="t" r="r" b="b"/>
                 <a:pathLst>
-                  <a:path h="6355080" w="6355080">
+                  <a:path w="6355080" h="6355080">
                     <a:moveTo>
                       <a:pt x="3177540" y="6355080"/>
                     </a:moveTo>
@@ -4007,12 +4319,12 @@
         </p:grpSp>
         <p:sp>
           <p:nvSpPr>
-            <p:cNvPr name="TextBox 16" id="16"/>
-            <p:cNvSpPr txBox="true"/>
+            <p:cNvPr id="16" name="TextBox 16"/>
+            <p:cNvSpPr txBox="1"/>
             <p:nvPr/>
           </p:nvSpPr>
           <p:spPr>
-            <a:xfrm rot="0">
+            <a:xfrm>
               <a:off x="366298" y="330796"/>
               <a:ext cx="442528" cy="532581"/>
             </a:xfrm>
@@ -4021,12 +4333,12 @@
             </a:prstGeom>
           </p:spPr>
           <p:txBody>
-            <a:bodyPr anchor="t" rtlCol="false" tIns="0" lIns="0" bIns="0" rIns="0">
+            <a:bodyPr lIns="0" tIns="0" rIns="0" bIns="0" rtlCol="0" anchor="t">
               <a:spAutoFit/>
             </a:bodyPr>
             <a:lstStyle/>
             <a:p>
-              <a:pPr algn="ctr" marL="0" indent="0" lvl="0">
+              <a:pPr marL="0" lvl="0" indent="0" algn="ctr">
                 <a:lnSpc>
                   <a:spcPts val="2612"/>
                 </a:lnSpc>
@@ -4049,12 +4361,12 @@
       </p:grpSp>
       <p:sp>
         <p:nvSpPr>
-          <p:cNvPr name="TextBox 17" id="17"/>
-          <p:cNvSpPr txBox="true"/>
+          <p:cNvPr id="17" name="TextBox 17"/>
+          <p:cNvSpPr txBox="1"/>
           <p:nvPr/>
         </p:nvSpPr>
         <p:spPr>
-          <a:xfrm rot="0">
+          <a:xfrm>
             <a:off x="9040016" y="6053748"/>
             <a:ext cx="4190940" cy="424744"/>
           </a:xfrm>
@@ -4063,12 +4375,12 @@
           </a:prstGeom>
         </p:spPr>
         <p:txBody>
-          <a:bodyPr anchor="t" rtlCol="false" tIns="0" lIns="0" bIns="0" rIns="0">
+          <a:bodyPr lIns="0" tIns="0" rIns="0" bIns="0" rtlCol="0" anchor="t">
             <a:spAutoFit/>
           </a:bodyPr>
           <a:lstStyle/>
           <a:p>
-            <a:pPr marL="0" indent="0" lvl="0">
+            <a:pPr marL="0" lvl="0" indent="0">
               <a:lnSpc>
                 <a:spcPts val="2940"/>
               </a:lnSpc>
@@ -4090,12 +4402,12 @@
       </p:sp>
       <p:grpSp>
         <p:nvGrpSpPr>
-          <p:cNvPr name="Group 18" id="18"/>
+          <p:cNvPr id="18" name="Group 18"/>
           <p:cNvGrpSpPr/>
           <p:nvPr/>
         </p:nvGrpSpPr>
         <p:grpSpPr>
-          <a:xfrm rot="0">
+          <a:xfrm>
             <a:off x="11539864" y="6759179"/>
             <a:ext cx="881343" cy="881343"/>
             <a:chOff x="0" y="0"/>
@@ -4104,14 +4416,14 @@
         </p:grpSpPr>
         <p:grpSp>
           <p:nvGrpSpPr>
-            <p:cNvPr name="Group 19" id="19"/>
+            <p:cNvPr id="19" name="Group 19"/>
             <p:cNvGrpSpPr>
-              <a:grpSpLocks noChangeAspect="true"/>
+              <a:grpSpLocks noChangeAspect="1"/>
             </p:cNvGrpSpPr>
             <p:nvPr/>
           </p:nvGrpSpPr>
           <p:grpSpPr>
-            <a:xfrm rot="0">
+            <a:xfrm>
               <a:off x="0" y="0"/>
               <a:ext cx="1175123" cy="1175123"/>
               <a:chOff x="-2540" y="-2540"/>
@@ -4120,7 +4432,7 @@
           </p:grpSpPr>
           <p:sp>
             <p:nvSpPr>
-              <p:cNvPr name="Freeform 20" id="20"/>
+              <p:cNvPr id="20" name="Freeform 20"/>
               <p:cNvSpPr/>
               <p:nvPr/>
             </p:nvSpPr>
@@ -4134,9 +4446,9 @@
                 <a:gdLst/>
                 <a:ahLst/>
                 <a:cxnLst/>
-                <a:rect r="r" b="b" t="t" l="l"/>
+                <a:rect l="l" t="t" r="r" b="b"/>
                 <a:pathLst>
-                  <a:path h="6355080" w="6355080">
+                  <a:path w="6355080" h="6355080">
                     <a:moveTo>
                       <a:pt x="3177540" y="6355080"/>
                     </a:moveTo>
@@ -4236,12 +4548,12 @@
         </p:grpSp>
         <p:sp>
           <p:nvSpPr>
-            <p:cNvPr name="TextBox 21" id="21"/>
-            <p:cNvSpPr txBox="true"/>
+            <p:cNvPr id="21" name="TextBox 21"/>
+            <p:cNvSpPr txBox="1"/>
             <p:nvPr/>
           </p:nvSpPr>
           <p:spPr>
-            <a:xfrm rot="0">
+            <a:xfrm>
               <a:off x="366298" y="330081"/>
               <a:ext cx="442528" cy="534012"/>
             </a:xfrm>
@@ -4250,12 +4562,12 @@
             </a:prstGeom>
           </p:spPr>
           <p:txBody>
-            <a:bodyPr anchor="t" rtlCol="false" tIns="0" lIns="0" bIns="0" rIns="0">
+            <a:bodyPr lIns="0" tIns="0" rIns="0" bIns="0" rtlCol="0" anchor="t">
               <a:spAutoFit/>
             </a:bodyPr>
             <a:lstStyle/>
             <a:p>
-              <a:pPr algn="ctr" marL="0" indent="0" lvl="0">
+              <a:pPr marL="0" lvl="0" indent="0" algn="ctr">
                 <a:lnSpc>
                   <a:spcPts val="2612"/>
                 </a:lnSpc>
@@ -4278,12 +4590,12 @@
       </p:grpSp>
       <p:sp>
         <p:nvSpPr>
-          <p:cNvPr name="TextBox 22" id="22"/>
-          <p:cNvSpPr txBox="true"/>
+          <p:cNvPr id="22" name="TextBox 22"/>
+          <p:cNvSpPr txBox="1"/>
           <p:nvPr/>
         </p:nvSpPr>
         <p:spPr>
-          <a:xfrm rot="0">
+          <a:xfrm>
             <a:off x="12897457" y="6935090"/>
             <a:ext cx="4190940" cy="424744"/>
           </a:xfrm>
@@ -4292,12 +4604,12 @@
           </a:prstGeom>
         </p:spPr>
         <p:txBody>
-          <a:bodyPr anchor="t" rtlCol="false" tIns="0" lIns="0" bIns="0" rIns="0">
+          <a:bodyPr lIns="0" tIns="0" rIns="0" bIns="0" rtlCol="0" anchor="t">
             <a:spAutoFit/>
           </a:bodyPr>
           <a:lstStyle/>
           <a:p>
-            <a:pPr marL="0" indent="0" lvl="0">
+            <a:pPr marL="0" lvl="0" indent="0">
               <a:lnSpc>
                 <a:spcPts val="2940"/>
               </a:lnSpc>
@@ -4319,12 +4631,12 @@
       </p:sp>
       <p:grpSp>
         <p:nvGrpSpPr>
-          <p:cNvPr name="Group 23" id="23"/>
+          <p:cNvPr id="23" name="Group 23"/>
           <p:cNvGrpSpPr/>
           <p:nvPr/>
         </p:nvGrpSpPr>
         <p:grpSpPr>
-          <a:xfrm rot="0">
+          <a:xfrm>
             <a:off x="7682424" y="7755948"/>
             <a:ext cx="881343" cy="881343"/>
             <a:chOff x="0" y="0"/>
@@ -4333,14 +4645,14 @@
         </p:grpSpPr>
         <p:grpSp>
           <p:nvGrpSpPr>
-            <p:cNvPr name="Group 24" id="24"/>
+            <p:cNvPr id="24" name="Group 24"/>
             <p:cNvGrpSpPr>
-              <a:grpSpLocks noChangeAspect="true"/>
+              <a:grpSpLocks noChangeAspect="1"/>
             </p:cNvGrpSpPr>
             <p:nvPr/>
           </p:nvGrpSpPr>
           <p:grpSpPr>
-            <a:xfrm rot="0">
+            <a:xfrm>
               <a:off x="0" y="0"/>
               <a:ext cx="1175123" cy="1175123"/>
               <a:chOff x="-2540" y="-2540"/>
@@ -4349,7 +4661,7 @@
           </p:grpSpPr>
           <p:sp>
             <p:nvSpPr>
-              <p:cNvPr name="Freeform 25" id="25"/>
+              <p:cNvPr id="25" name="Freeform 25"/>
               <p:cNvSpPr/>
               <p:nvPr/>
             </p:nvSpPr>
@@ -4363,9 +4675,9 @@
                 <a:gdLst/>
                 <a:ahLst/>
                 <a:cxnLst/>
-                <a:rect r="r" b="b" t="t" l="l"/>
+                <a:rect l="l" t="t" r="r" b="b"/>
                 <a:pathLst>
-                  <a:path h="6355080" w="6355080">
+                  <a:path w="6355080" h="6355080">
                     <a:moveTo>
                       <a:pt x="3177540" y="6355080"/>
                     </a:moveTo>
@@ -4465,12 +4777,12 @@
         </p:grpSp>
         <p:sp>
           <p:nvSpPr>
-            <p:cNvPr name="TextBox 26" id="26"/>
-            <p:cNvSpPr txBox="true"/>
+            <p:cNvPr id="26" name="TextBox 26"/>
+            <p:cNvSpPr txBox="1"/>
             <p:nvPr/>
           </p:nvSpPr>
           <p:spPr>
-            <a:xfrm rot="0">
+            <a:xfrm>
               <a:off x="366298" y="330081"/>
               <a:ext cx="442528" cy="534012"/>
             </a:xfrm>
@@ -4479,12 +4791,12 @@
             </a:prstGeom>
           </p:spPr>
           <p:txBody>
-            <a:bodyPr anchor="t" rtlCol="false" tIns="0" lIns="0" bIns="0" rIns="0">
+            <a:bodyPr lIns="0" tIns="0" rIns="0" bIns="0" rtlCol="0" anchor="t">
               <a:spAutoFit/>
             </a:bodyPr>
             <a:lstStyle/>
             <a:p>
-              <a:pPr algn="ctr" marL="0" indent="0" lvl="0">
+              <a:pPr marL="0" lvl="0" indent="0" algn="ctr">
                 <a:lnSpc>
                   <a:spcPts val="2612"/>
                 </a:lnSpc>
@@ -4507,12 +4819,12 @@
       </p:grpSp>
       <p:sp>
         <p:nvSpPr>
-          <p:cNvPr name="TextBox 27" id="27"/>
-          <p:cNvSpPr txBox="true"/>
+          <p:cNvPr id="27" name="TextBox 27"/>
+          <p:cNvSpPr txBox="1"/>
           <p:nvPr/>
         </p:nvSpPr>
         <p:spPr>
-          <a:xfrm rot="0">
+          <a:xfrm>
             <a:off x="9040016" y="7931859"/>
             <a:ext cx="4190940" cy="424744"/>
           </a:xfrm>
@@ -4521,12 +4833,12 @@
           </a:prstGeom>
         </p:spPr>
         <p:txBody>
-          <a:bodyPr anchor="t" rtlCol="false" tIns="0" lIns="0" bIns="0" rIns="0">
+          <a:bodyPr lIns="0" tIns="0" rIns="0" bIns="0" rtlCol="0" anchor="t">
             <a:spAutoFit/>
           </a:bodyPr>
           <a:lstStyle/>
           <a:p>
-            <a:pPr marL="0" indent="0" lvl="0">
+            <a:pPr marL="0" lvl="0" indent="0">
               <a:lnSpc>
                 <a:spcPts val="2940"/>
               </a:lnSpc>
@@ -4555,13 +4867,14 @@
 </file>
 
 <file path=ppt/slides/slide3.xml><?xml version="1.0" encoding="utf-8"?>
-<p:sld xmlns:p="http://schemas.openxmlformats.org/presentationml/2006/main" xmlns:a="http://schemas.openxmlformats.org/drawingml/2006/main" xmlns:r="http://schemas.openxmlformats.org/officeDocument/2006/relationships">
+<p:sld xmlns:a="http://schemas.openxmlformats.org/drawingml/2006/main" xmlns:r="http://schemas.openxmlformats.org/officeDocument/2006/relationships" xmlns:p="http://schemas.openxmlformats.org/presentationml/2006/main">
   <p:cSld>
     <p:bg>
       <p:bgPr>
         <a:solidFill>
           <a:srgbClr val="0F2B34"/>
         </a:solidFill>
+        <a:effectLst/>
       </p:bgPr>
     </p:bg>
     <p:spTree>
@@ -4580,21 +4893,21 @@
       </p:grpSpPr>
       <p:pic>
         <p:nvPicPr>
-          <p:cNvPr name="Picture 2" id="2"/>
+          <p:cNvPr id="2" name="Picture 2"/>
           <p:cNvPicPr>
-            <a:picLocks noChangeAspect="true"/>
+            <a:picLocks noChangeAspect="1"/>
           </p:cNvPicPr>
           <p:nvPr/>
         </p:nvPicPr>
         <p:blipFill>
           <a:blip r:embed="rId2"/>
-          <a:srcRect l="0" t="0" r="0" b="0"/>
+          <a:srcRect/>
           <a:stretch>
             <a:fillRect/>
           </a:stretch>
         </p:blipFill>
         <p:spPr>
-          <a:xfrm flipH="false" flipV="false" rot="0">
+          <a:xfrm>
             <a:off x="7731936" y="2888706"/>
             <a:ext cx="2824128" cy="2918265"/>
           </a:xfrm>
@@ -4605,12 +4918,12 @@
       </p:pic>
       <p:sp>
         <p:nvSpPr>
-          <p:cNvPr name="TextBox 3" id="3"/>
-          <p:cNvSpPr txBox="true"/>
+          <p:cNvPr id="3" name="TextBox 3"/>
+          <p:cNvSpPr txBox="1"/>
           <p:nvPr/>
         </p:nvSpPr>
         <p:spPr>
-          <a:xfrm rot="0">
+          <a:xfrm>
             <a:off x="6691312" y="6261071"/>
             <a:ext cx="4905375" cy="630555"/>
           </a:xfrm>
@@ -4619,7 +4932,7 @@
           </a:prstGeom>
         </p:spPr>
         <p:txBody>
-          <a:bodyPr anchor="t" rtlCol="false" tIns="0" lIns="0" bIns="0" rIns="0">
+          <a:bodyPr lIns="0" tIns="0" rIns="0" bIns="0" rtlCol="0" anchor="t">
             <a:spAutoFit/>
           </a:bodyPr>
           <a:lstStyle/>
@@ -4650,13 +4963,14 @@
 </file>
 
 <file path=ppt/slides/slide4.xml><?xml version="1.0" encoding="utf-8"?>
-<p:sld xmlns:p="http://schemas.openxmlformats.org/presentationml/2006/main" xmlns:a="http://schemas.openxmlformats.org/drawingml/2006/main" xmlns:r="http://schemas.openxmlformats.org/officeDocument/2006/relationships">
+<p:sld xmlns:a="http://schemas.openxmlformats.org/drawingml/2006/main" xmlns:r="http://schemas.openxmlformats.org/officeDocument/2006/relationships" xmlns:p="http://schemas.openxmlformats.org/presentationml/2006/main">
   <p:cSld>
     <p:bg>
       <p:bgPr>
         <a:solidFill>
           <a:srgbClr val="0F2B34"/>
         </a:solidFill>
+        <a:effectLst/>
       </p:bgPr>
     </p:bg>
     <p:spTree>
@@ -4675,21 +4989,21 @@
       </p:grpSpPr>
       <p:pic>
         <p:nvPicPr>
-          <p:cNvPr name="Picture 2" id="2"/>
+          <p:cNvPr id="2" name="Picture 2"/>
           <p:cNvPicPr>
-            <a:picLocks noChangeAspect="true"/>
+            <a:picLocks noChangeAspect="1"/>
           </p:cNvPicPr>
           <p:nvPr/>
         </p:nvPicPr>
         <p:blipFill>
           <a:blip r:embed="rId2"/>
-          <a:srcRect l="0" t="2759" r="0" b="2759"/>
+          <a:srcRect t="2759" b="2759"/>
           <a:stretch>
             <a:fillRect/>
           </a:stretch>
         </p:blipFill>
         <p:spPr>
-          <a:xfrm flipH="false" flipV="false" rot="0">
+          <a:xfrm>
             <a:off x="1200012" y="780120"/>
             <a:ext cx="16059288" cy="8952146"/>
           </a:xfrm>
@@ -4698,6 +5012,55 @@
           </a:prstGeom>
         </p:spPr>
       </p:pic>
+      <p:sp>
+        <p:nvSpPr>
+          <p:cNvPr id="3" name="Elipse 2">
+            <a:extLst>
+              <a:ext uri="{FF2B5EF4-FFF2-40B4-BE49-F238E27FC236}">
+                <a16:creationId xmlns:a16="http://schemas.microsoft.com/office/drawing/2014/main" id="{D393CE8A-F351-4809-AA38-98EF08F9A5BF}"/>
+              </a:ext>
+            </a:extLst>
+          </p:cNvPr>
+          <p:cNvSpPr/>
+          <p:nvPr/>
+        </p:nvSpPr>
+        <p:spPr>
+          <a:xfrm>
+            <a:off x="9448800" y="7124700"/>
+            <a:ext cx="609600" cy="685800"/>
+          </a:xfrm>
+          <a:prstGeom prst="ellipse">
+            <a:avLst/>
+          </a:prstGeom>
+          <a:ln>
+            <a:solidFill>
+              <a:schemeClr val="bg1"/>
+            </a:solidFill>
+          </a:ln>
+        </p:spPr>
+        <p:style>
+          <a:lnRef idx="2">
+            <a:schemeClr val="accent6"/>
+          </a:lnRef>
+          <a:fillRef idx="1">
+            <a:schemeClr val="lt1"/>
+          </a:fillRef>
+          <a:effectRef idx="0">
+            <a:schemeClr val="accent6"/>
+          </a:effectRef>
+          <a:fontRef idx="minor">
+            <a:schemeClr val="dk1"/>
+          </a:fontRef>
+        </p:style>
+        <p:txBody>
+          <a:bodyPr rtlCol="0" anchor="ctr"/>
+          <a:lstStyle/>
+          <a:p>
+            <a:pPr algn="ctr"/>
+            <a:endParaRPr lang="pt-BR"/>
+          </a:p>
+        </p:txBody>
+      </p:sp>
     </p:spTree>
   </p:cSld>
   <p:clrMapOvr>
@@ -4707,13 +5070,14 @@
 </file>
 
 <file path=ppt/slides/slide5.xml><?xml version="1.0" encoding="utf-8"?>
-<p:sld xmlns:p="http://schemas.openxmlformats.org/presentationml/2006/main" xmlns:a="http://schemas.openxmlformats.org/drawingml/2006/main" xmlns:r="http://schemas.openxmlformats.org/officeDocument/2006/relationships">
+<p:sld xmlns:a="http://schemas.openxmlformats.org/drawingml/2006/main" xmlns:r="http://schemas.openxmlformats.org/officeDocument/2006/relationships" xmlns:p="http://schemas.openxmlformats.org/presentationml/2006/main">
   <p:cSld>
     <p:bg>
       <p:bgPr>
         <a:solidFill>
           <a:srgbClr val="0F2B34"/>
         </a:solidFill>
+        <a:effectLst/>
       </p:bgPr>
     </p:bg>
     <p:spTree>
@@ -4732,21 +5096,21 @@
       </p:grpSpPr>
       <p:pic>
         <p:nvPicPr>
-          <p:cNvPr name="Picture 2" id="2"/>
+          <p:cNvPr id="2" name="Picture 2"/>
           <p:cNvPicPr>
-            <a:picLocks noChangeAspect="true"/>
+            <a:picLocks noChangeAspect="1"/>
           </p:cNvPicPr>
           <p:nvPr/>
         </p:nvPicPr>
         <p:blipFill>
           <a:blip r:embed="rId2"/>
-          <a:srcRect l="0" t="2649" r="0" b="2649"/>
+          <a:srcRect t="2649" b="2649"/>
           <a:stretch>
             <a:fillRect/>
           </a:stretch>
         </p:blipFill>
         <p:spPr>
-          <a:xfrm flipH="false" flipV="false" rot="0">
+          <a:xfrm>
             <a:off x="1028700" y="172216"/>
             <a:ext cx="16091083" cy="10038378"/>
           </a:xfrm>
@@ -4755,6 +5119,709 @@
           </a:prstGeom>
         </p:spPr>
       </p:pic>
+      <p:sp>
+        <p:nvSpPr>
+          <p:cNvPr id="3" name="Elipse 2">
+            <a:extLst>
+              <a:ext uri="{FF2B5EF4-FFF2-40B4-BE49-F238E27FC236}">
+                <a16:creationId xmlns:a16="http://schemas.microsoft.com/office/drawing/2014/main" id="{0BE986BC-332F-4230-9B4C-53D1CEB411C9}"/>
+              </a:ext>
+            </a:extLst>
+          </p:cNvPr>
+          <p:cNvSpPr/>
+          <p:nvPr/>
+        </p:nvSpPr>
+        <p:spPr>
+          <a:xfrm>
+            <a:off x="10363200" y="1409700"/>
+            <a:ext cx="609600" cy="533400"/>
+          </a:xfrm>
+          <a:prstGeom prst="ellipse">
+            <a:avLst/>
+          </a:prstGeom>
+          <a:ln>
+            <a:solidFill>
+              <a:schemeClr val="bg1"/>
+            </a:solidFill>
+          </a:ln>
+        </p:spPr>
+        <p:style>
+          <a:lnRef idx="2">
+            <a:schemeClr val="accent6"/>
+          </a:lnRef>
+          <a:fillRef idx="1">
+            <a:schemeClr val="lt1"/>
+          </a:fillRef>
+          <a:effectRef idx="0">
+            <a:schemeClr val="accent6"/>
+          </a:effectRef>
+          <a:fontRef idx="minor">
+            <a:schemeClr val="dk1"/>
+          </a:fontRef>
+        </p:style>
+        <p:txBody>
+          <a:bodyPr rtlCol="0" anchor="ctr"/>
+          <a:lstStyle/>
+          <a:p>
+            <a:pPr algn="ctr"/>
+            <a:endParaRPr lang="pt-BR"/>
+          </a:p>
+        </p:txBody>
+      </p:sp>
+      <p:grpSp>
+        <p:nvGrpSpPr>
+          <p:cNvPr id="6" name="Agrupar 5">
+            <a:extLst>
+              <a:ext uri="{FF2B5EF4-FFF2-40B4-BE49-F238E27FC236}">
+                <a16:creationId xmlns:a16="http://schemas.microsoft.com/office/drawing/2014/main" id="{14E6399A-5FFE-4434-8027-F3456FAE29B6}"/>
+              </a:ext>
+            </a:extLst>
+          </p:cNvPr>
+          <p:cNvGrpSpPr/>
+          <p:nvPr/>
+        </p:nvGrpSpPr>
+        <p:grpSpPr>
+          <a:xfrm>
+            <a:off x="10619612" y="1803822"/>
+            <a:ext cx="210600" cy="138240"/>
+            <a:chOff x="10619612" y="1803822"/>
+            <a:chExt cx="210600" cy="138240"/>
+          </a:xfrm>
+        </p:grpSpPr>
+        <mc:AlternateContent xmlns:mc="http://schemas.openxmlformats.org/markup-compatibility/2006">
+          <mc:Choice xmlns:p14="http://schemas.microsoft.com/office/powerpoint/2010/main" xmlns:aink="http://schemas.microsoft.com/office/drawing/2016/ink" Requires="p14 aink">
+            <p:contentPart p14:bwMode="auto" r:id="rId3">
+              <p14:nvContentPartPr>
+                <p14:cNvPr id="4" name="Tinta 3">
+                  <a:extLst>
+                    <a:ext uri="{FF2B5EF4-FFF2-40B4-BE49-F238E27FC236}">
+                      <a16:creationId xmlns:a16="http://schemas.microsoft.com/office/drawing/2014/main" id="{07706456-8CB9-4AA0-94DE-09A85F81D67C}"/>
+                    </a:ext>
+                  </a:extLst>
+                </p14:cNvPr>
+                <p14:cNvContentPartPr/>
+                <p14:nvPr/>
+              </p14:nvContentPartPr>
+              <p14:xfrm>
+                <a:off x="10619612" y="1803822"/>
+                <a:ext cx="210600" cy="138240"/>
+              </p14:xfrm>
+            </p:contentPart>
+          </mc:Choice>
+          <mc:Fallback>
+            <p:pic>
+              <p:nvPicPr>
+                <p:cNvPr id="4" name="Tinta 3">
+                  <a:extLst>
+                    <a:ext uri="{FF2B5EF4-FFF2-40B4-BE49-F238E27FC236}">
+                      <a16:creationId xmlns:a16="http://schemas.microsoft.com/office/drawing/2014/main" id="{07706456-8CB9-4AA0-94DE-09A85F81D67C}"/>
+                    </a:ext>
+                  </a:extLst>
+                </p:cNvPr>
+                <p:cNvPicPr/>
+                <p:nvPr/>
+              </p:nvPicPr>
+              <p:blipFill>
+                <a:blip r:embed="rId4"/>
+                <a:stretch>
+                  <a:fillRect/>
+                </a:stretch>
+              </p:blipFill>
+              <p:spPr>
+                <a:xfrm>
+                  <a:off x="10601612" y="1695822"/>
+                  <a:ext cx="246240" cy="353880"/>
+                </a:xfrm>
+                <a:prstGeom prst="rect">
+                  <a:avLst/>
+                </a:prstGeom>
+              </p:spPr>
+            </p:pic>
+          </mc:Fallback>
+        </mc:AlternateContent>
+        <mc:AlternateContent xmlns:mc="http://schemas.openxmlformats.org/markup-compatibility/2006">
+          <mc:Choice xmlns:p14="http://schemas.microsoft.com/office/powerpoint/2010/main" xmlns:aink="http://schemas.microsoft.com/office/drawing/2016/ink" Requires="p14 aink">
+            <p:contentPart p14:bwMode="auto" r:id="rId5">
+              <p14:nvContentPartPr>
+                <p14:cNvPr id="5" name="Tinta 4">
+                  <a:extLst>
+                    <a:ext uri="{FF2B5EF4-FFF2-40B4-BE49-F238E27FC236}">
+                      <a16:creationId xmlns:a16="http://schemas.microsoft.com/office/drawing/2014/main" id="{53BBBC64-9BA2-4231-86B3-11B8533BCE3A}"/>
+                    </a:ext>
+                  </a:extLst>
+                </p14:cNvPr>
+                <p14:cNvContentPartPr/>
+                <p14:nvPr/>
+              </p14:nvContentPartPr>
+              <p14:xfrm>
+                <a:off x="10803932" y="1912902"/>
+                <a:ext cx="360" cy="360"/>
+              </p14:xfrm>
+            </p:contentPart>
+          </mc:Choice>
+          <mc:Fallback>
+            <p:pic>
+              <p:nvPicPr>
+                <p:cNvPr id="5" name="Tinta 4">
+                  <a:extLst>
+                    <a:ext uri="{FF2B5EF4-FFF2-40B4-BE49-F238E27FC236}">
+                      <a16:creationId xmlns:a16="http://schemas.microsoft.com/office/drawing/2014/main" id="{53BBBC64-9BA2-4231-86B3-11B8533BCE3A}"/>
+                    </a:ext>
+                  </a:extLst>
+                </p:cNvPr>
+                <p:cNvPicPr/>
+                <p:nvPr/>
+              </p:nvPicPr>
+              <p:blipFill>
+                <a:blip r:embed="rId6"/>
+                <a:stretch>
+                  <a:fillRect/>
+                </a:stretch>
+              </p:blipFill>
+              <p:spPr>
+                <a:xfrm>
+                  <a:off x="10785932" y="1804902"/>
+                  <a:ext cx="36000" cy="216000"/>
+                </a:xfrm>
+                <a:prstGeom prst="rect">
+                  <a:avLst/>
+                </a:prstGeom>
+              </p:spPr>
+            </p:pic>
+          </mc:Fallback>
+        </mc:AlternateContent>
+      </p:grpSp>
+      <mc:AlternateContent xmlns:mc="http://schemas.openxmlformats.org/markup-compatibility/2006">
+        <mc:Choice xmlns:p14="http://schemas.microsoft.com/office/powerpoint/2010/main" xmlns:aink="http://schemas.microsoft.com/office/drawing/2016/ink" Requires="p14 aink">
+          <p:contentPart p14:bwMode="auto" r:id="rId7">
+            <p14:nvContentPartPr>
+              <p14:cNvPr id="7" name="Tinta 6">
+                <a:extLst>
+                  <a:ext uri="{FF2B5EF4-FFF2-40B4-BE49-F238E27FC236}">
+                    <a16:creationId xmlns:a16="http://schemas.microsoft.com/office/drawing/2014/main" id="{5067F7EE-5FCD-4FC8-AECD-FAF08D71C382}"/>
+                  </a:ext>
+                </a:extLst>
+              </p14:cNvPr>
+              <p14:cNvContentPartPr/>
+              <p14:nvPr/>
+            </p14:nvContentPartPr>
+            <p14:xfrm>
+              <a:off x="10606652" y="1856382"/>
+              <a:ext cx="360" cy="360"/>
+            </p14:xfrm>
+          </p:contentPart>
+        </mc:Choice>
+        <mc:Fallback>
+          <p:pic>
+            <p:nvPicPr>
+              <p:cNvPr id="7" name="Tinta 6">
+                <a:extLst>
+                  <a:ext uri="{FF2B5EF4-FFF2-40B4-BE49-F238E27FC236}">
+                    <a16:creationId xmlns:a16="http://schemas.microsoft.com/office/drawing/2014/main" id="{5067F7EE-5FCD-4FC8-AECD-FAF08D71C382}"/>
+                  </a:ext>
+                </a:extLst>
+              </p:cNvPr>
+              <p:cNvPicPr/>
+              <p:nvPr/>
+            </p:nvPicPr>
+            <p:blipFill>
+              <a:blip r:embed="rId8"/>
+              <a:stretch>
+                <a:fillRect/>
+              </a:stretch>
+            </p:blipFill>
+            <p:spPr>
+              <a:xfrm>
+                <a:off x="10588652" y="1748742"/>
+                <a:ext cx="36000" cy="216000"/>
+              </a:xfrm>
+              <a:prstGeom prst="rect">
+                <a:avLst/>
+              </a:prstGeom>
+            </p:spPr>
+          </p:pic>
+        </mc:Fallback>
+      </mc:AlternateContent>
+      <mc:AlternateContent xmlns:mc="http://schemas.openxmlformats.org/markup-compatibility/2006">
+        <mc:Choice xmlns:p14="http://schemas.microsoft.com/office/powerpoint/2010/main" Requires="p14">
+          <p:contentPart p14:bwMode="auto" r:id="rId9">
+            <p14:nvContentPartPr>
+              <p14:cNvPr id="12" name="Tinta 11">
+                <a:extLst>
+                  <a:ext uri="{FF2B5EF4-FFF2-40B4-BE49-F238E27FC236}">
+                    <a16:creationId xmlns:a16="http://schemas.microsoft.com/office/drawing/2014/main" id="{CC3D1E79-2EF6-4E82-89FE-1CEDDBA28301}"/>
+                  </a:ext>
+                </a:extLst>
+              </p14:cNvPr>
+              <p14:cNvContentPartPr/>
+              <p14:nvPr/>
+            </p14:nvContentPartPr>
+            <p14:xfrm>
+              <a:off x="10484612" y="1751622"/>
+              <a:ext cx="507600" cy="225360"/>
+            </p14:xfrm>
+          </p:contentPart>
+        </mc:Choice>
+        <mc:Fallback>
+          <p:pic>
+            <p:nvPicPr>
+              <p:cNvPr id="12" name="Tinta 11">
+                <a:extLst>
+                  <a:ext uri="{FF2B5EF4-FFF2-40B4-BE49-F238E27FC236}">
+                    <a16:creationId xmlns:a16="http://schemas.microsoft.com/office/drawing/2014/main" id="{CC3D1E79-2EF6-4E82-89FE-1CEDDBA28301}"/>
+                  </a:ext>
+                </a:extLst>
+              </p:cNvPr>
+              <p:cNvPicPr/>
+              <p:nvPr/>
+            </p:nvPicPr>
+            <p:blipFill>
+              <a:blip r:embed="rId10"/>
+              <a:stretch>
+                <a:fillRect/>
+              </a:stretch>
+            </p:blipFill>
+            <p:spPr>
+              <a:xfrm>
+                <a:off x="10475612" y="1742622"/>
+                <a:ext cx="525240" cy="243000"/>
+              </a:xfrm>
+              <a:prstGeom prst="rect">
+                <a:avLst/>
+              </a:prstGeom>
+            </p:spPr>
+          </p:pic>
+        </mc:Fallback>
+      </mc:AlternateContent>
+      <mc:AlternateContent xmlns:mc="http://schemas.openxmlformats.org/markup-compatibility/2006">
+        <mc:Choice xmlns:p14="http://schemas.microsoft.com/office/powerpoint/2010/main" Requires="p14">
+          <p:contentPart p14:bwMode="auto" r:id="rId11">
+            <p14:nvContentPartPr>
+              <p14:cNvPr id="14" name="Tinta 13">
+                <a:extLst>
+                  <a:ext uri="{FF2B5EF4-FFF2-40B4-BE49-F238E27FC236}">
+                    <a16:creationId xmlns:a16="http://schemas.microsoft.com/office/drawing/2014/main" id="{6FAF28D7-9EFE-4B96-809C-D410B42C1B13}"/>
+                  </a:ext>
+                </a:extLst>
+              </p14:cNvPr>
+              <p14:cNvContentPartPr/>
+              <p14:nvPr/>
+            </p14:nvContentPartPr>
+            <p14:xfrm>
+              <a:off x="6999092" y="7293822"/>
+              <a:ext cx="673560" cy="92520"/>
+            </p14:xfrm>
+          </p:contentPart>
+        </mc:Choice>
+        <mc:Fallback>
+          <p:pic>
+            <p:nvPicPr>
+              <p:cNvPr id="14" name="Tinta 13">
+                <a:extLst>
+                  <a:ext uri="{FF2B5EF4-FFF2-40B4-BE49-F238E27FC236}">
+                    <a16:creationId xmlns:a16="http://schemas.microsoft.com/office/drawing/2014/main" id="{6FAF28D7-9EFE-4B96-809C-D410B42C1B13}"/>
+                  </a:ext>
+                </a:extLst>
+              </p:cNvPr>
+              <p:cNvPicPr/>
+              <p:nvPr/>
+            </p:nvPicPr>
+            <p:blipFill>
+              <a:blip r:embed="rId12"/>
+              <a:stretch>
+                <a:fillRect/>
+              </a:stretch>
+            </p:blipFill>
+            <p:spPr>
+              <a:xfrm>
+                <a:off x="6945452" y="7186182"/>
+                <a:ext cx="781200" cy="308160"/>
+              </a:xfrm>
+              <a:prstGeom prst="rect">
+                <a:avLst/>
+              </a:prstGeom>
+            </p:spPr>
+          </p:pic>
+        </mc:Fallback>
+      </mc:AlternateContent>
+      <mc:AlternateContent xmlns:mc="http://schemas.openxmlformats.org/markup-compatibility/2006">
+        <mc:Choice xmlns:p14="http://schemas.microsoft.com/office/powerpoint/2010/main" Requires="p14">
+          <p:contentPart p14:bwMode="auto" r:id="rId13">
+            <p14:nvContentPartPr>
+              <p14:cNvPr id="15" name="Tinta 14">
+                <a:extLst>
+                  <a:ext uri="{FF2B5EF4-FFF2-40B4-BE49-F238E27FC236}">
+                    <a16:creationId xmlns:a16="http://schemas.microsoft.com/office/drawing/2014/main" id="{E1CEA6AD-2AF0-4641-A642-9629AADB771C}"/>
+                  </a:ext>
+                </a:extLst>
+              </p14:cNvPr>
+              <p14:cNvContentPartPr/>
+              <p14:nvPr/>
+            </p14:nvContentPartPr>
+            <p14:xfrm>
+              <a:off x="6872372" y="6747342"/>
+              <a:ext cx="828000" cy="633600"/>
+            </p14:xfrm>
+          </p:contentPart>
+        </mc:Choice>
+        <mc:Fallback>
+          <p:pic>
+            <p:nvPicPr>
+              <p:cNvPr id="15" name="Tinta 14">
+                <a:extLst>
+                  <a:ext uri="{FF2B5EF4-FFF2-40B4-BE49-F238E27FC236}">
+                    <a16:creationId xmlns:a16="http://schemas.microsoft.com/office/drawing/2014/main" id="{E1CEA6AD-2AF0-4641-A642-9629AADB771C}"/>
+                  </a:ext>
+                </a:extLst>
+              </p:cNvPr>
+              <p:cNvPicPr/>
+              <p:nvPr/>
+            </p:nvPicPr>
+            <p:blipFill>
+              <a:blip r:embed="rId14"/>
+              <a:stretch>
+                <a:fillRect/>
+              </a:stretch>
+            </p:blipFill>
+            <p:spPr>
+              <a:xfrm>
+                <a:off x="6818372" y="6639342"/>
+                <a:ext cx="935640" cy="849240"/>
+              </a:xfrm>
+              <a:prstGeom prst="rect">
+                <a:avLst/>
+              </a:prstGeom>
+            </p:spPr>
+          </p:pic>
+        </mc:Fallback>
+      </mc:AlternateContent>
+      <mc:AlternateContent xmlns:mc="http://schemas.openxmlformats.org/markup-compatibility/2006">
+        <mc:Choice xmlns:p14="http://schemas.microsoft.com/office/powerpoint/2010/main" Requires="p14">
+          <p:contentPart p14:bwMode="auto" r:id="rId15">
+            <p14:nvContentPartPr>
+              <p14:cNvPr id="16" name="Tinta 15">
+                <a:extLst>
+                  <a:ext uri="{FF2B5EF4-FFF2-40B4-BE49-F238E27FC236}">
+                    <a16:creationId xmlns:a16="http://schemas.microsoft.com/office/drawing/2014/main" id="{64F5E96C-6A85-4985-895A-0F6810A1369A}"/>
+                  </a:ext>
+                </a:extLst>
+              </p14:cNvPr>
+              <p14:cNvContentPartPr/>
+              <p14:nvPr/>
+            </p14:nvContentPartPr>
+            <p14:xfrm>
+              <a:off x="6878852" y="6498582"/>
+              <a:ext cx="903960" cy="425520"/>
+            </p14:xfrm>
+          </p:contentPart>
+        </mc:Choice>
+        <mc:Fallback>
+          <p:pic>
+            <p:nvPicPr>
+              <p:cNvPr id="16" name="Tinta 15">
+                <a:extLst>
+                  <a:ext uri="{FF2B5EF4-FFF2-40B4-BE49-F238E27FC236}">
+                    <a16:creationId xmlns:a16="http://schemas.microsoft.com/office/drawing/2014/main" id="{64F5E96C-6A85-4985-895A-0F6810A1369A}"/>
+                  </a:ext>
+                </a:extLst>
+              </p:cNvPr>
+              <p:cNvPicPr/>
+              <p:nvPr/>
+            </p:nvPicPr>
+            <p:blipFill>
+              <a:blip r:embed="rId16"/>
+              <a:stretch>
+                <a:fillRect/>
+              </a:stretch>
+            </p:blipFill>
+            <p:spPr>
+              <a:xfrm>
+                <a:off x="6824852" y="6390942"/>
+                <a:ext cx="1011600" cy="641160"/>
+              </a:xfrm>
+              <a:prstGeom prst="rect">
+                <a:avLst/>
+              </a:prstGeom>
+            </p:spPr>
+          </p:pic>
+        </mc:Fallback>
+      </mc:AlternateContent>
+      <mc:AlternateContent xmlns:mc="http://schemas.openxmlformats.org/markup-compatibility/2006">
+        <mc:Choice xmlns:p14="http://schemas.microsoft.com/office/powerpoint/2010/main" Requires="p14">
+          <p:contentPart p14:bwMode="auto" r:id="rId17">
+            <p14:nvContentPartPr>
+              <p14:cNvPr id="17" name="Tinta 16">
+                <a:extLst>
+                  <a:ext uri="{FF2B5EF4-FFF2-40B4-BE49-F238E27FC236}">
+                    <a16:creationId xmlns:a16="http://schemas.microsoft.com/office/drawing/2014/main" id="{865B5667-2179-4576-A6AB-ED72D7DA2D3D}"/>
+                  </a:ext>
+                </a:extLst>
+              </p14:cNvPr>
+              <p14:cNvContentPartPr/>
+              <p14:nvPr/>
+            </p14:nvContentPartPr>
+            <p14:xfrm>
+              <a:off x="7121852" y="7272222"/>
+              <a:ext cx="469800" cy="96480"/>
+            </p14:xfrm>
+          </p:contentPart>
+        </mc:Choice>
+        <mc:Fallback>
+          <p:pic>
+            <p:nvPicPr>
+              <p:cNvPr id="17" name="Tinta 16">
+                <a:extLst>
+                  <a:ext uri="{FF2B5EF4-FFF2-40B4-BE49-F238E27FC236}">
+                    <a16:creationId xmlns:a16="http://schemas.microsoft.com/office/drawing/2014/main" id="{865B5667-2179-4576-A6AB-ED72D7DA2D3D}"/>
+                  </a:ext>
+                </a:extLst>
+              </p:cNvPr>
+              <p:cNvPicPr/>
+              <p:nvPr/>
+            </p:nvPicPr>
+            <p:blipFill>
+              <a:blip r:embed="rId18"/>
+              <a:stretch>
+                <a:fillRect/>
+              </a:stretch>
+            </p:blipFill>
+            <p:spPr>
+              <a:xfrm>
+                <a:off x="7067852" y="7164582"/>
+                <a:ext cx="577440" cy="312120"/>
+              </a:xfrm>
+              <a:prstGeom prst="rect">
+                <a:avLst/>
+              </a:prstGeom>
+            </p:spPr>
+          </p:pic>
+        </mc:Fallback>
+      </mc:AlternateContent>
+      <mc:AlternateContent xmlns:mc="http://schemas.openxmlformats.org/markup-compatibility/2006">
+        <mc:Choice xmlns:p14="http://schemas.microsoft.com/office/powerpoint/2010/main" Requires="p14">
+          <p:contentPart p14:bwMode="auto" r:id="rId19">
+            <p14:nvContentPartPr>
+              <p14:cNvPr id="19" name="Tinta 18">
+                <a:extLst>
+                  <a:ext uri="{FF2B5EF4-FFF2-40B4-BE49-F238E27FC236}">
+                    <a16:creationId xmlns:a16="http://schemas.microsoft.com/office/drawing/2014/main" id="{62299D18-24AC-449B-BFD0-147D722CC8E3}"/>
+                  </a:ext>
+                </a:extLst>
+              </p14:cNvPr>
+              <p14:cNvContentPartPr/>
+              <p14:nvPr/>
+            </p14:nvContentPartPr>
+            <p14:xfrm>
+              <a:off x="7060292" y="7216422"/>
+              <a:ext cx="958320" cy="219240"/>
+            </p14:xfrm>
+          </p:contentPart>
+        </mc:Choice>
+        <mc:Fallback>
+          <p:pic>
+            <p:nvPicPr>
+              <p:cNvPr id="19" name="Tinta 18">
+                <a:extLst>
+                  <a:ext uri="{FF2B5EF4-FFF2-40B4-BE49-F238E27FC236}">
+                    <a16:creationId xmlns:a16="http://schemas.microsoft.com/office/drawing/2014/main" id="{62299D18-24AC-449B-BFD0-147D722CC8E3}"/>
+                  </a:ext>
+                </a:extLst>
+              </p:cNvPr>
+              <p:cNvPicPr/>
+              <p:nvPr/>
+            </p:nvPicPr>
+            <p:blipFill>
+              <a:blip r:embed="rId20"/>
+              <a:stretch>
+                <a:fillRect/>
+              </a:stretch>
+            </p:blipFill>
+            <p:spPr>
+              <a:xfrm>
+                <a:off x="7051652" y="7207422"/>
+                <a:ext cx="975960" cy="236880"/>
+              </a:xfrm>
+              <a:prstGeom prst="rect">
+                <a:avLst/>
+              </a:prstGeom>
+            </p:spPr>
+          </p:pic>
+        </mc:Fallback>
+      </mc:AlternateContent>
+      <p:grpSp>
+        <p:nvGrpSpPr>
+          <p:cNvPr id="23" name="Agrupar 22">
+            <a:extLst>
+              <a:ext uri="{FF2B5EF4-FFF2-40B4-BE49-F238E27FC236}">
+                <a16:creationId xmlns:a16="http://schemas.microsoft.com/office/drawing/2014/main" id="{1CD01BC4-AFC8-4A58-A6EB-8D20419E5FBC}"/>
+              </a:ext>
+            </a:extLst>
+          </p:cNvPr>
+          <p:cNvGrpSpPr/>
+          <p:nvPr/>
+        </p:nvGrpSpPr>
+        <p:grpSpPr>
+          <a:xfrm>
+            <a:off x="7089812" y="7263222"/>
+            <a:ext cx="968400" cy="193680"/>
+            <a:chOff x="7089812" y="7263222"/>
+            <a:chExt cx="968400" cy="193680"/>
+          </a:xfrm>
+        </p:grpSpPr>
+        <mc:AlternateContent xmlns:mc="http://schemas.openxmlformats.org/markup-compatibility/2006">
+          <mc:Choice xmlns:p14="http://schemas.microsoft.com/office/powerpoint/2010/main" Requires="p14">
+            <p:contentPart p14:bwMode="auto" r:id="rId21">
+              <p14:nvContentPartPr>
+                <p14:cNvPr id="20" name="Tinta 19">
+                  <a:extLst>
+                    <a:ext uri="{FF2B5EF4-FFF2-40B4-BE49-F238E27FC236}">
+                      <a16:creationId xmlns:a16="http://schemas.microsoft.com/office/drawing/2014/main" id="{9A638282-1BC5-4BCD-BD9A-8778B069B570}"/>
+                    </a:ext>
+                  </a:extLst>
+                </p14:cNvPr>
+                <p14:cNvContentPartPr/>
+                <p14:nvPr/>
+              </p14:nvContentPartPr>
+              <p14:xfrm>
+                <a:off x="7270532" y="7342422"/>
+                <a:ext cx="459000" cy="59400"/>
+              </p14:xfrm>
+            </p:contentPart>
+          </mc:Choice>
+          <mc:Fallback>
+            <p:pic>
+              <p:nvPicPr>
+                <p:cNvPr id="20" name="Tinta 19">
+                  <a:extLst>
+                    <a:ext uri="{FF2B5EF4-FFF2-40B4-BE49-F238E27FC236}">
+                      <a16:creationId xmlns:a16="http://schemas.microsoft.com/office/drawing/2014/main" id="{9A638282-1BC5-4BCD-BD9A-8778B069B570}"/>
+                    </a:ext>
+                  </a:extLst>
+                </p:cNvPr>
+                <p:cNvPicPr/>
+                <p:nvPr/>
+              </p:nvPicPr>
+              <p:blipFill>
+                <a:blip r:embed="rId22"/>
+                <a:stretch>
+                  <a:fillRect/>
+                </a:stretch>
+              </p:blipFill>
+              <p:spPr>
+                <a:xfrm>
+                  <a:off x="7261892" y="7333782"/>
+                  <a:ext cx="476640" cy="77040"/>
+                </a:xfrm>
+                <a:prstGeom prst="rect">
+                  <a:avLst/>
+                </a:prstGeom>
+              </p:spPr>
+            </p:pic>
+          </mc:Fallback>
+        </mc:AlternateContent>
+        <mc:AlternateContent xmlns:mc="http://schemas.openxmlformats.org/markup-compatibility/2006">
+          <mc:Choice xmlns:p14="http://schemas.microsoft.com/office/powerpoint/2010/main" Requires="p14">
+            <p:contentPart p14:bwMode="auto" r:id="rId23">
+              <p14:nvContentPartPr>
+                <p14:cNvPr id="21" name="Tinta 20">
+                  <a:extLst>
+                    <a:ext uri="{FF2B5EF4-FFF2-40B4-BE49-F238E27FC236}">
+                      <a16:creationId xmlns:a16="http://schemas.microsoft.com/office/drawing/2014/main" id="{AACD4626-961E-4D89-8E06-9AEA46FBA5FA}"/>
+                    </a:ext>
+                  </a:extLst>
+                </p14:cNvPr>
+                <p14:cNvContentPartPr/>
+                <p14:nvPr/>
+              </p14:nvContentPartPr>
+              <p14:xfrm>
+                <a:off x="7217972" y="7263222"/>
+                <a:ext cx="840240" cy="193680"/>
+              </p14:xfrm>
+            </p:contentPart>
+          </mc:Choice>
+          <mc:Fallback>
+            <p:pic>
+              <p:nvPicPr>
+                <p:cNvPr id="21" name="Tinta 20">
+                  <a:extLst>
+                    <a:ext uri="{FF2B5EF4-FFF2-40B4-BE49-F238E27FC236}">
+                      <a16:creationId xmlns:a16="http://schemas.microsoft.com/office/drawing/2014/main" id="{AACD4626-961E-4D89-8E06-9AEA46FBA5FA}"/>
+                    </a:ext>
+                  </a:extLst>
+                </p:cNvPr>
+                <p:cNvPicPr/>
+                <p:nvPr/>
+              </p:nvPicPr>
+              <p:blipFill>
+                <a:blip r:embed="rId24"/>
+                <a:stretch>
+                  <a:fillRect/>
+                </a:stretch>
+              </p:blipFill>
+              <p:spPr>
+                <a:xfrm>
+                  <a:off x="7208972" y="7254222"/>
+                  <a:ext cx="857880" cy="211320"/>
+                </a:xfrm>
+                <a:prstGeom prst="rect">
+                  <a:avLst/>
+                </a:prstGeom>
+              </p:spPr>
+            </p:pic>
+          </mc:Fallback>
+        </mc:AlternateContent>
+        <mc:AlternateContent xmlns:mc="http://schemas.openxmlformats.org/markup-compatibility/2006">
+          <mc:Choice xmlns:p14="http://schemas.microsoft.com/office/powerpoint/2010/main" Requires="p14">
+            <p:contentPart p14:bwMode="auto" r:id="rId25">
+              <p14:nvContentPartPr>
+                <p14:cNvPr id="22" name="Tinta 21">
+                  <a:extLst>
+                    <a:ext uri="{FF2B5EF4-FFF2-40B4-BE49-F238E27FC236}">
+                      <a16:creationId xmlns:a16="http://schemas.microsoft.com/office/drawing/2014/main" id="{21D3F4A2-9D2A-4420-899F-899F7DB3EEF2}"/>
+                    </a:ext>
+                  </a:extLst>
+                </p14:cNvPr>
+                <p14:cNvContentPartPr/>
+                <p14:nvPr/>
+              </p14:nvContentPartPr>
+              <p14:xfrm>
+                <a:off x="7089812" y="7286622"/>
+                <a:ext cx="941760" cy="84960"/>
+              </p14:xfrm>
+            </p:contentPart>
+          </mc:Choice>
+          <mc:Fallback>
+            <p:pic>
+              <p:nvPicPr>
+                <p:cNvPr id="22" name="Tinta 21">
+                  <a:extLst>
+                    <a:ext uri="{FF2B5EF4-FFF2-40B4-BE49-F238E27FC236}">
+                      <a16:creationId xmlns:a16="http://schemas.microsoft.com/office/drawing/2014/main" id="{21D3F4A2-9D2A-4420-899F-899F7DB3EEF2}"/>
+                    </a:ext>
+                  </a:extLst>
+                </p:cNvPr>
+                <p:cNvPicPr/>
+                <p:nvPr/>
+              </p:nvPicPr>
+              <p:blipFill>
+                <a:blip r:embed="rId26"/>
+                <a:stretch>
+                  <a:fillRect/>
+                </a:stretch>
+              </p:blipFill>
+              <p:spPr>
+                <a:xfrm>
+                  <a:off x="7081172" y="7277982"/>
+                  <a:ext cx="959400" cy="102600"/>
+                </a:xfrm>
+                <a:prstGeom prst="rect">
+                  <a:avLst/>
+                </a:prstGeom>
+              </p:spPr>
+            </p:pic>
+          </mc:Fallback>
+        </mc:AlternateContent>
+      </p:grpSp>
     </p:spTree>
   </p:cSld>
   <p:clrMapOvr>
@@ -4764,13 +5831,14 @@
 </file>
 
 <file path=ppt/slides/slide6.xml><?xml version="1.0" encoding="utf-8"?>
-<p:sld xmlns:p="http://schemas.openxmlformats.org/presentationml/2006/main" xmlns:a="http://schemas.openxmlformats.org/drawingml/2006/main" xmlns:r="http://schemas.openxmlformats.org/officeDocument/2006/relationships">
+<p:sld xmlns:a="http://schemas.openxmlformats.org/drawingml/2006/main" xmlns:r="http://schemas.openxmlformats.org/officeDocument/2006/relationships" xmlns:p="http://schemas.openxmlformats.org/presentationml/2006/main">
   <p:cSld>
     <p:bg>
       <p:bgPr>
         <a:solidFill>
           <a:srgbClr val="0F2B34"/>
         </a:solidFill>
+        <a:effectLst/>
       </p:bgPr>
     </p:bg>
     <p:spTree>
@@ -4789,21 +5857,21 @@
       </p:grpSpPr>
       <p:pic>
         <p:nvPicPr>
-          <p:cNvPr name="Picture 2" id="2"/>
+          <p:cNvPr id="2" name="Picture 2"/>
           <p:cNvPicPr>
-            <a:picLocks noChangeAspect="true"/>
+            <a:picLocks noChangeAspect="1"/>
           </p:cNvPicPr>
           <p:nvPr/>
         </p:nvPicPr>
         <p:blipFill>
           <a:blip r:embed="rId2"/>
-          <a:srcRect l="0" t="0" r="0" b="0"/>
+          <a:srcRect/>
           <a:stretch>
             <a:fillRect/>
           </a:stretch>
         </p:blipFill>
         <p:spPr>
-          <a:xfrm flipH="false" flipV="false" rot="0">
+          <a:xfrm>
             <a:off x="8252487" y="3773533"/>
             <a:ext cx="1783027" cy="1783027"/>
           </a:xfrm>
@@ -4814,12 +5882,12 @@
       </p:pic>
       <p:sp>
         <p:nvSpPr>
-          <p:cNvPr name="TextBox 3" id="3"/>
-          <p:cNvSpPr txBox="true"/>
+          <p:cNvPr id="3" name="TextBox 3"/>
+          <p:cNvSpPr txBox="1"/>
           <p:nvPr/>
         </p:nvSpPr>
         <p:spPr>
-          <a:xfrm rot="0">
+          <a:xfrm>
             <a:off x="8472487" y="5480360"/>
             <a:ext cx="1343025" cy="716280"/>
           </a:xfrm>
@@ -4828,7 +5896,7 @@
           </a:prstGeom>
         </p:spPr>
         <p:txBody>
-          <a:bodyPr anchor="t" rtlCol="false" tIns="0" lIns="0" bIns="0" rIns="0">
+          <a:bodyPr lIns="0" tIns="0" rIns="0" bIns="0" rtlCol="0" anchor="t">
             <a:spAutoFit/>
           </a:bodyPr>
           <a:lstStyle/>
@@ -4859,13 +5927,14 @@
 </file>
 
 <file path=ppt/slides/slide7.xml><?xml version="1.0" encoding="utf-8"?>
-<p:sld xmlns:p="http://schemas.openxmlformats.org/presentationml/2006/main" xmlns:a="http://schemas.openxmlformats.org/drawingml/2006/main" xmlns:r="http://schemas.openxmlformats.org/officeDocument/2006/relationships">
+<p:sld xmlns:a="http://schemas.openxmlformats.org/drawingml/2006/main" xmlns:r="http://schemas.openxmlformats.org/officeDocument/2006/relationships" xmlns:p="http://schemas.openxmlformats.org/presentationml/2006/main">
   <p:cSld>
     <p:bg>
       <p:bgPr>
         <a:solidFill>
           <a:srgbClr val="0F2B34"/>
         </a:solidFill>
+        <a:effectLst/>
       </p:bgPr>
     </p:bg>
     <p:spTree>
@@ -4884,21 +5953,21 @@
       </p:grpSpPr>
       <p:pic>
         <p:nvPicPr>
-          <p:cNvPr name="Picture 2" id="2"/>
+          <p:cNvPr id="2" name="Picture 2"/>
           <p:cNvPicPr>
-            <a:picLocks noChangeAspect="true"/>
+            <a:picLocks noChangeAspect="1"/>
           </p:cNvPicPr>
           <p:nvPr/>
         </p:nvPicPr>
         <p:blipFill>
           <a:blip r:embed="rId2"/>
-          <a:srcRect l="0" t="0" r="0" b="0"/>
+          <a:srcRect/>
           <a:stretch>
             <a:fillRect/>
           </a:stretch>
         </p:blipFill>
         <p:spPr>
-          <a:xfrm flipH="false" flipV="false" rot="0">
+          <a:xfrm>
             <a:off x="-217231" y="123211"/>
             <a:ext cx="3229186" cy="1816417"/>
           </a:xfrm>
@@ -4909,21 +5978,21 @@
       </p:pic>
       <p:pic>
         <p:nvPicPr>
-          <p:cNvPr name="Picture 3" id="3"/>
+          <p:cNvPr id="3" name="Picture 3"/>
           <p:cNvPicPr>
-            <a:picLocks noChangeAspect="true"/>
+            <a:picLocks noChangeAspect="1"/>
           </p:cNvPicPr>
           <p:nvPr/>
         </p:nvPicPr>
         <p:blipFill>
           <a:blip r:embed="rId3"/>
-          <a:srcRect l="1340" t="0" r="1340" b="1675"/>
+          <a:srcRect l="1340" r="1340" b="1675"/>
           <a:stretch>
             <a:fillRect/>
           </a:stretch>
         </p:blipFill>
         <p:spPr>
-          <a:xfrm flipH="false" flipV="false" rot="0">
+          <a:xfrm>
             <a:off x="0" y="2427301"/>
             <a:ext cx="18288000" cy="6074300"/>
           </a:xfrm>
@@ -4941,13 +6010,14 @@
 </file>
 
 <file path=ppt/slides/slide8.xml><?xml version="1.0" encoding="utf-8"?>
-<p:sld xmlns:p="http://schemas.openxmlformats.org/presentationml/2006/main" xmlns:a="http://schemas.openxmlformats.org/drawingml/2006/main" xmlns:r="http://schemas.openxmlformats.org/officeDocument/2006/relationships">
+<p:sld xmlns:a="http://schemas.openxmlformats.org/drawingml/2006/main" xmlns:r="http://schemas.openxmlformats.org/officeDocument/2006/relationships" xmlns:p="http://schemas.openxmlformats.org/presentationml/2006/main">
   <p:cSld>
     <p:bg>
       <p:bgPr>
         <a:solidFill>
           <a:srgbClr val="0F2B34"/>
         </a:solidFill>
+        <a:effectLst/>
       </p:bgPr>
     </p:bg>
     <p:spTree>
@@ -4966,21 +6036,21 @@
       </p:grpSpPr>
       <p:pic>
         <p:nvPicPr>
-          <p:cNvPr name="Picture 2" id="2"/>
+          <p:cNvPr id="2" name="Picture 2"/>
           <p:cNvPicPr>
-            <a:picLocks noChangeAspect="true"/>
+            <a:picLocks noChangeAspect="1"/>
           </p:cNvPicPr>
           <p:nvPr/>
         </p:nvPicPr>
         <p:blipFill>
           <a:blip r:embed="rId2"/>
-          <a:srcRect l="0" t="0" r="0" b="0"/>
+          <a:srcRect/>
           <a:stretch>
             <a:fillRect/>
           </a:stretch>
         </p:blipFill>
         <p:spPr>
-          <a:xfrm flipH="false" flipV="false" rot="0">
+          <a:xfrm>
             <a:off x="2648703" y="1644754"/>
             <a:ext cx="12990594" cy="7810975"/>
           </a:xfrm>
@@ -4991,12 +6061,12 @@
       </p:pic>
       <p:sp>
         <p:nvSpPr>
-          <p:cNvPr name="TextBox 3" id="3"/>
-          <p:cNvSpPr txBox="true"/>
+          <p:cNvPr id="3" name="TextBox 3"/>
+          <p:cNvSpPr txBox="1"/>
           <p:nvPr/>
         </p:nvSpPr>
         <p:spPr>
-          <a:xfrm rot="0">
+          <a:xfrm>
             <a:off x="2648703" y="234805"/>
             <a:ext cx="12990594" cy="786765"/>
           </a:xfrm>
@@ -5005,7 +6075,7 @@
           </a:prstGeom>
         </p:spPr>
         <p:txBody>
-          <a:bodyPr anchor="t" rtlCol="false" tIns="0" lIns="0" bIns="0" rIns="0">
+          <a:bodyPr lIns="0" tIns="0" rIns="0" bIns="0" rtlCol="0" anchor="t">
             <a:spAutoFit/>
           </a:bodyPr>
           <a:lstStyle/>
@@ -5036,13 +6106,14 @@
 </file>
 
 <file path=ppt/slides/slide9.xml><?xml version="1.0" encoding="utf-8"?>
-<p:sld xmlns:p="http://schemas.openxmlformats.org/presentationml/2006/main" xmlns:a="http://schemas.openxmlformats.org/drawingml/2006/main">
+<p:sld xmlns:a="http://schemas.openxmlformats.org/drawingml/2006/main" xmlns:r="http://schemas.openxmlformats.org/officeDocument/2006/relationships" xmlns:p="http://schemas.openxmlformats.org/presentationml/2006/main">
   <p:cSld>
     <p:bg>
       <p:bgPr>
         <a:solidFill>
           <a:srgbClr val="0F2B34"/>
         </a:solidFill>
+        <a:effectLst/>
       </p:bgPr>
     </p:bg>
     <p:spTree>
@@ -5061,12 +6132,12 @@
       </p:grpSpPr>
       <p:sp>
         <p:nvSpPr>
-          <p:cNvPr name="TextBox 2" id="2"/>
-          <p:cNvSpPr txBox="true"/>
+          <p:cNvPr id="2" name="TextBox 2"/>
+          <p:cNvSpPr txBox="1"/>
           <p:nvPr/>
         </p:nvSpPr>
         <p:spPr>
-          <a:xfrm rot="0">
+          <a:xfrm>
             <a:off x="5796421" y="5560711"/>
             <a:ext cx="6181725" cy="584835"/>
           </a:xfrm>
@@ -5075,7 +6146,7 @@
           </a:prstGeom>
         </p:spPr>
         <p:txBody>
-          <a:bodyPr anchor="t" rtlCol="false" tIns="0" lIns="0" bIns="0" rIns="0">
+          <a:bodyPr lIns="0" tIns="0" rIns="0" bIns="0" rtlCol="0" anchor="t">
             <a:spAutoFit/>
           </a:bodyPr>
           <a:lstStyle/>
@@ -5086,7 +6157,7 @@
               </a:lnSpc>
             </a:pPr>
             <a:r>
-              <a:rPr lang="en-US" sz="3400">
+              <a:rPr lang="en-US" sz="3400" dirty="0">
                 <a:solidFill>
                   <a:srgbClr val="FFFFFF"/>
                 </a:solidFill>
@@ -5099,12 +6170,12 @@
       </p:sp>
       <p:sp>
         <p:nvSpPr>
-          <p:cNvPr name="TextBox 3" id="3"/>
-          <p:cNvSpPr txBox="true"/>
+          <p:cNvPr id="3" name="TextBox 3"/>
+          <p:cNvSpPr txBox="1"/>
           <p:nvPr/>
         </p:nvSpPr>
         <p:spPr>
-          <a:xfrm rot="0">
+          <a:xfrm>
             <a:off x="5429709" y="4315924"/>
             <a:ext cx="6915150" cy="584835"/>
           </a:xfrm>
@@ -5113,7 +6184,7 @@
           </a:prstGeom>
         </p:spPr>
         <p:txBody>
-          <a:bodyPr anchor="t" rtlCol="false" tIns="0" lIns="0" bIns="0" rIns="0">
+          <a:bodyPr lIns="0" tIns="0" rIns="0" bIns="0" rtlCol="0" anchor="t">
             <a:spAutoFit/>
           </a:bodyPr>
           <a:lstStyle/>
@@ -5124,34 +6195,34 @@
               </a:lnSpc>
             </a:pPr>
             <a:r>
-              <a:rPr lang="en-US" sz="3400">
+              <a:rPr lang="en-US" sz="3400" dirty="0">
                 <a:solidFill>
                   <a:srgbClr val="FFFFFF"/>
                 </a:solidFill>
                 <a:latin typeface="Open Sans Light"/>
               </a:rPr>
-              <a:t>Qual foi a minha maior dificuldade ?</a:t>
-            </a:r>
-          </a:p>
-        </p:txBody>
-      </p:sp>
-      <p:sp>
-        <p:nvSpPr>
-          <p:cNvPr name="TextBox 4" id="4"/>
-          <p:cNvSpPr txBox="true"/>
+              <a:t>Qual foi a minha maior dificuldade? </a:t>
+            </a:r>
+          </a:p>
+        </p:txBody>
+      </p:sp>
+      <p:sp>
+        <p:nvSpPr>
+          <p:cNvPr id="4" name="TextBox 4"/>
+          <p:cNvSpPr txBox="1"/>
           <p:nvPr/>
         </p:nvSpPr>
         <p:spPr>
-          <a:xfrm rot="0">
-            <a:off x="3757775" y="3102891"/>
-            <a:ext cx="10772451" cy="535926"/>
+          <a:xfrm>
+            <a:off x="3733801" y="3102891"/>
+            <a:ext cx="10796426" cy="535926"/>
           </a:xfrm>
           <a:prstGeom prst="rect">
             <a:avLst/>
           </a:prstGeom>
         </p:spPr>
         <p:txBody>
-          <a:bodyPr anchor="t" rtlCol="false" tIns="0" lIns="0" bIns="0" rIns="0">
+          <a:bodyPr wrap="square" lIns="0" tIns="0" rIns="0" bIns="0" rtlCol="0" anchor="t">
             <a:spAutoFit/>
           </a:bodyPr>
           <a:lstStyle/>
@@ -5162,7 +6233,7 @@
               </a:lnSpc>
             </a:pPr>
             <a:r>
-              <a:rPr lang="en-US" sz="3141">
+              <a:rPr lang="en-US" sz="3141" dirty="0">
                 <a:solidFill>
                   <a:srgbClr val="FFFFFF"/>
                 </a:solidFill>
@@ -5175,12 +6246,12 @@
       </p:sp>
       <p:sp>
         <p:nvSpPr>
-          <p:cNvPr name="TextBox 5" id="5"/>
-          <p:cNvSpPr txBox="true"/>
+          <p:cNvPr id="5" name="TextBox 5"/>
+          <p:cNvSpPr txBox="1"/>
           <p:nvPr/>
         </p:nvSpPr>
         <p:spPr>
-          <a:xfrm rot="0">
+          <a:xfrm>
             <a:off x="8053846" y="6542124"/>
             <a:ext cx="1428750" cy="584835"/>
           </a:xfrm>
@@ -5189,7 +6260,7 @@
           </a:prstGeom>
         </p:spPr>
         <p:txBody>
-          <a:bodyPr anchor="t" rtlCol="false" tIns="0" lIns="0" bIns="0" rIns="0">
+          <a:bodyPr lIns="0" tIns="0" rIns="0" bIns="0" rtlCol="0" anchor="t">
             <a:spAutoFit/>
           </a:bodyPr>
           <a:lstStyle/>
@@ -5200,7 +6271,7 @@
               </a:lnSpc>
             </a:pPr>
             <a:r>
-              <a:rPr lang="en-US" sz="3400">
+              <a:rPr lang="en-US" sz="3400" dirty="0">
                 <a:solidFill>
                   <a:srgbClr val="FFFFFF"/>
                 </a:solidFill>
@@ -5211,11 +6282,533 @@
           </a:p>
         </p:txBody>
       </p:sp>
+      <p:sp>
+        <p:nvSpPr>
+          <p:cNvPr id="9" name="CaixaDeTexto 8">
+            <a:extLst>
+              <a:ext uri="{FF2B5EF4-FFF2-40B4-BE49-F238E27FC236}">
+                <a16:creationId xmlns:a16="http://schemas.microsoft.com/office/drawing/2014/main" id="{CD57D2E4-1CB2-4CBC-AAF0-DC6C7799AEEA}"/>
+              </a:ext>
+            </a:extLst>
+          </p:cNvPr>
+          <p:cNvSpPr txBox="1"/>
+          <p:nvPr/>
+        </p:nvSpPr>
+        <p:spPr>
+          <a:xfrm>
+            <a:off x="7572464" y="8332371"/>
+            <a:ext cx="2209800" cy="646716"/>
+          </a:xfrm>
+          <a:prstGeom prst="rect">
+            <a:avLst/>
+          </a:prstGeom>
+          <a:noFill/>
+        </p:spPr>
+        <p:txBody>
+          <a:bodyPr wrap="square">
+            <a:spAutoFit/>
+          </a:bodyPr>
+          <a:lstStyle/>
+          <a:p>
+            <a:pPr marL="457200" indent="-457200" algn="ctr">
+              <a:lnSpc>
+                <a:spcPts val="4759"/>
+              </a:lnSpc>
+              <a:buFont typeface="Arial" panose="020B0604020202020204" pitchFamily="34" charset="0"/>
+              <a:buChar char="•"/>
+            </a:pPr>
+            <a:r>
+              <a:rPr lang="en-US" sz="2800" b="1" dirty="0">
+                <a:solidFill>
+                  <a:srgbClr val="FFFFFF"/>
+                </a:solidFill>
+                <a:latin typeface="Open Sans Light"/>
+              </a:rPr>
+              <a:t>Paciência</a:t>
+            </a:r>
+          </a:p>
+        </p:txBody>
+      </p:sp>
+      <p:sp>
+        <p:nvSpPr>
+          <p:cNvPr id="11" name="CaixaDeTexto 10">
+            <a:extLst>
+              <a:ext uri="{FF2B5EF4-FFF2-40B4-BE49-F238E27FC236}">
+                <a16:creationId xmlns:a16="http://schemas.microsoft.com/office/drawing/2014/main" id="{31173395-CE44-4055-9D0D-3F72F99F103E}"/>
+              </a:ext>
+            </a:extLst>
+          </p:cNvPr>
+          <p:cNvSpPr txBox="1"/>
+          <p:nvPr/>
+        </p:nvSpPr>
+        <p:spPr>
+          <a:xfrm>
+            <a:off x="10039704" y="8332371"/>
+            <a:ext cx="2209800" cy="646716"/>
+          </a:xfrm>
+          <a:prstGeom prst="rect">
+            <a:avLst/>
+          </a:prstGeom>
+          <a:noFill/>
+        </p:spPr>
+        <p:txBody>
+          <a:bodyPr wrap="square">
+            <a:spAutoFit/>
+          </a:bodyPr>
+          <a:lstStyle/>
+          <a:p>
+            <a:pPr marL="457200" indent="-457200" algn="ctr">
+              <a:lnSpc>
+                <a:spcPts val="4759"/>
+              </a:lnSpc>
+              <a:buFont typeface="Arial" panose="020B0604020202020204" pitchFamily="34" charset="0"/>
+              <a:buChar char="•"/>
+            </a:pPr>
+            <a:r>
+              <a:rPr lang="en-US" sz="2800" b="1" dirty="0">
+                <a:solidFill>
+                  <a:srgbClr val="FFFFFF"/>
+                </a:solidFill>
+                <a:latin typeface="Open Sans Light"/>
+              </a:rPr>
+              <a:t>Coragem</a:t>
+            </a:r>
+          </a:p>
+        </p:txBody>
+      </p:sp>
+      <p:sp>
+        <p:nvSpPr>
+          <p:cNvPr id="13" name="CaixaDeTexto 12">
+            <a:extLst>
+              <a:ext uri="{FF2B5EF4-FFF2-40B4-BE49-F238E27FC236}">
+                <a16:creationId xmlns:a16="http://schemas.microsoft.com/office/drawing/2014/main" id="{9BFE452A-D838-4F5C-AF57-238D3E9A6134}"/>
+              </a:ext>
+            </a:extLst>
+          </p:cNvPr>
+          <p:cNvSpPr txBox="1"/>
+          <p:nvPr/>
+        </p:nvSpPr>
+        <p:spPr>
+          <a:xfrm>
+            <a:off x="5257625" y="8332371"/>
+            <a:ext cx="2057400" cy="646716"/>
+          </a:xfrm>
+          <a:prstGeom prst="rect">
+            <a:avLst/>
+          </a:prstGeom>
+          <a:noFill/>
+        </p:spPr>
+        <p:txBody>
+          <a:bodyPr wrap="square">
+            <a:spAutoFit/>
+          </a:bodyPr>
+          <a:lstStyle/>
+          <a:p>
+            <a:pPr marL="457200" indent="-457200" algn="ctr">
+              <a:lnSpc>
+                <a:spcPts val="4759"/>
+              </a:lnSpc>
+              <a:buFont typeface="Arial" panose="020B0604020202020204" pitchFamily="34" charset="0"/>
+              <a:buChar char="•"/>
+            </a:pPr>
+            <a:r>
+              <a:rPr lang="en-US" sz="2800" b="1" dirty="0">
+                <a:solidFill>
+                  <a:srgbClr val="FFFFFF"/>
+                </a:solidFill>
+                <a:latin typeface="Open Sans Light"/>
+              </a:rPr>
+              <a:t>Foco</a:t>
+            </a:r>
+          </a:p>
+        </p:txBody>
+      </p:sp>
     </p:spTree>
   </p:cSld>
   <p:clrMapOvr>
     <a:masterClrMapping/>
   </p:clrMapOvr>
+  <mc:AlternateContent xmlns:mc="http://schemas.openxmlformats.org/markup-compatibility/2006">
+    <mc:Choice xmlns:p14="http://schemas.microsoft.com/office/powerpoint/2010/main" Requires="p14">
+      <p:transition p14:dur="10"/>
+    </mc:Choice>
+    <mc:Fallback>
+      <p:transition/>
+    </mc:Fallback>
+  </mc:AlternateContent>
+  <p:timing>
+    <p:tnLst>
+      <p:par>
+        <p:cTn id="1" dur="indefinite" restart="never" nodeType="tmRoot">
+          <p:childTnLst>
+            <p:seq concurrent="1" nextAc="seek">
+              <p:cTn id="2" dur="indefinite" nodeType="mainSeq">
+                <p:childTnLst>
+                  <p:par>
+                    <p:cTn id="3" fill="hold">
+                      <p:stCondLst>
+                        <p:cond delay="indefinite"/>
+                      </p:stCondLst>
+                      <p:childTnLst>
+                        <p:par>
+                          <p:cTn id="4" fill="hold">
+                            <p:stCondLst>
+                              <p:cond delay="0"/>
+                            </p:stCondLst>
+                            <p:childTnLst>
+                              <p:par>
+                                <p:cTn id="5" presetID="1" presetClass="entr" presetSubtype="0" fill="hold" nodeType="clickEffect">
+                                  <p:stCondLst>
+                                    <p:cond delay="0"/>
+                                  </p:stCondLst>
+                                  <p:childTnLst>
+                                    <p:set>
+                                      <p:cBhvr>
+                                        <p:cTn id="6" dur="1" fill="hold">
+                                          <p:stCondLst>
+                                            <p:cond delay="0"/>
+                                          </p:stCondLst>
+                                        </p:cTn>
+                                        <p:tgtEl>
+                                          <p:spTgt spid="4">
+                                            <p:txEl>
+                                              <p:pRg st="0" end="0"/>
+                                            </p:txEl>
+                                          </p:spTgt>
+                                        </p:tgtEl>
+                                        <p:attrNameLst>
+                                          <p:attrName>style.visibility</p:attrName>
+                                        </p:attrNameLst>
+                                      </p:cBhvr>
+                                      <p:to>
+                                        <p:strVal val="visible"/>
+                                      </p:to>
+                                    </p:set>
+                                  </p:childTnLst>
+                                </p:cTn>
+                              </p:par>
+                            </p:childTnLst>
+                          </p:cTn>
+                        </p:par>
+                      </p:childTnLst>
+                    </p:cTn>
+                  </p:par>
+                  <p:par>
+                    <p:cTn id="7" fill="hold">
+                      <p:stCondLst>
+                        <p:cond delay="indefinite"/>
+                      </p:stCondLst>
+                      <p:childTnLst>
+                        <p:par>
+                          <p:cTn id="8" fill="hold">
+                            <p:stCondLst>
+                              <p:cond delay="0"/>
+                            </p:stCondLst>
+                            <p:childTnLst>
+                              <p:par>
+                                <p:cTn id="9" presetID="1" presetClass="entr" presetSubtype="0" fill="hold" nodeType="clickEffect">
+                                  <p:stCondLst>
+                                    <p:cond delay="0"/>
+                                  </p:stCondLst>
+                                  <p:childTnLst>
+                                    <p:set>
+                                      <p:cBhvr>
+                                        <p:cTn id="10" dur="1" fill="hold">
+                                          <p:stCondLst>
+                                            <p:cond delay="0"/>
+                                          </p:stCondLst>
+                                        </p:cTn>
+                                        <p:tgtEl>
+                                          <p:spTgt spid="3">
+                                            <p:txEl>
+                                              <p:pRg st="0" end="0"/>
+                                            </p:txEl>
+                                          </p:spTgt>
+                                        </p:tgtEl>
+                                        <p:attrNameLst>
+                                          <p:attrName>style.visibility</p:attrName>
+                                        </p:attrNameLst>
+                                      </p:cBhvr>
+                                      <p:to>
+                                        <p:strVal val="visible"/>
+                                      </p:to>
+                                    </p:set>
+                                  </p:childTnLst>
+                                </p:cTn>
+                              </p:par>
+                            </p:childTnLst>
+                          </p:cTn>
+                        </p:par>
+                      </p:childTnLst>
+                    </p:cTn>
+                  </p:par>
+                  <p:par>
+                    <p:cTn id="11" fill="hold">
+                      <p:stCondLst>
+                        <p:cond delay="indefinite"/>
+                      </p:stCondLst>
+                      <p:childTnLst>
+                        <p:par>
+                          <p:cTn id="12" fill="hold">
+                            <p:stCondLst>
+                              <p:cond delay="0"/>
+                            </p:stCondLst>
+                            <p:childTnLst>
+                              <p:par>
+                                <p:cTn id="13" presetID="1" presetClass="entr" presetSubtype="0" fill="hold" nodeType="clickEffect">
+                                  <p:stCondLst>
+                                    <p:cond delay="0"/>
+                                  </p:stCondLst>
+                                  <p:childTnLst>
+                                    <p:set>
+                                      <p:cBhvr>
+                                        <p:cTn id="14" dur="1" fill="hold">
+                                          <p:stCondLst>
+                                            <p:cond delay="0"/>
+                                          </p:stCondLst>
+                                        </p:cTn>
+                                        <p:tgtEl>
+                                          <p:spTgt spid="2">
+                                            <p:txEl>
+                                              <p:pRg st="0" end="0"/>
+                                            </p:txEl>
+                                          </p:spTgt>
+                                        </p:tgtEl>
+                                        <p:attrNameLst>
+                                          <p:attrName>style.visibility</p:attrName>
+                                        </p:attrNameLst>
+                                      </p:cBhvr>
+                                      <p:to>
+                                        <p:strVal val="visible"/>
+                                      </p:to>
+                                    </p:set>
+                                  </p:childTnLst>
+                                </p:cTn>
+                              </p:par>
+                            </p:childTnLst>
+                          </p:cTn>
+                        </p:par>
+                      </p:childTnLst>
+                    </p:cTn>
+                  </p:par>
+                  <p:par>
+                    <p:cTn id="15" fill="hold">
+                      <p:stCondLst>
+                        <p:cond delay="indefinite"/>
+                      </p:stCondLst>
+                      <p:childTnLst>
+                        <p:par>
+                          <p:cTn id="16" fill="hold">
+                            <p:stCondLst>
+                              <p:cond delay="0"/>
+                            </p:stCondLst>
+                            <p:childTnLst>
+                              <p:par>
+                                <p:cTn id="17" presetID="1" presetClass="entr" presetSubtype="0" fill="hold" nodeType="clickEffect">
+                                  <p:stCondLst>
+                                    <p:cond delay="0"/>
+                                  </p:stCondLst>
+                                  <p:childTnLst>
+                                    <p:set>
+                                      <p:cBhvr>
+                                        <p:cTn id="18" dur="1" fill="hold">
+                                          <p:stCondLst>
+                                            <p:cond delay="0"/>
+                                          </p:stCondLst>
+                                        </p:cTn>
+                                        <p:tgtEl>
+                                          <p:spTgt spid="5">
+                                            <p:txEl>
+                                              <p:pRg st="0" end="0"/>
+                                            </p:txEl>
+                                          </p:spTgt>
+                                        </p:tgtEl>
+                                        <p:attrNameLst>
+                                          <p:attrName>style.visibility</p:attrName>
+                                        </p:attrNameLst>
+                                      </p:cBhvr>
+                                      <p:to>
+                                        <p:strVal val="visible"/>
+                                      </p:to>
+                                    </p:set>
+                                  </p:childTnLst>
+                                </p:cTn>
+                              </p:par>
+                            </p:childTnLst>
+                          </p:cTn>
+                        </p:par>
+                      </p:childTnLst>
+                    </p:cTn>
+                  </p:par>
+                  <p:par>
+                    <p:cTn id="19" fill="hold">
+                      <p:stCondLst>
+                        <p:cond delay="indefinite"/>
+                      </p:stCondLst>
+                      <p:childTnLst>
+                        <p:par>
+                          <p:cTn id="20" fill="hold">
+                            <p:stCondLst>
+                              <p:cond delay="0"/>
+                            </p:stCondLst>
+                            <p:childTnLst>
+                              <p:par>
+                                <p:cTn id="21" presetID="1" presetClass="entr" presetSubtype="0" fill="hold" nodeType="clickEffect">
+                                  <p:stCondLst>
+                                    <p:cond delay="0"/>
+                                  </p:stCondLst>
+                                  <p:childTnLst>
+                                    <p:set>
+                                      <p:cBhvr>
+                                        <p:cTn id="22" dur="1" fill="hold">
+                                          <p:stCondLst>
+                                            <p:cond delay="0"/>
+                                          </p:stCondLst>
+                                        </p:cTn>
+                                        <p:tgtEl>
+                                          <p:spTgt spid="13">
+                                            <p:txEl>
+                                              <p:pRg st="0" end="0"/>
+                                            </p:txEl>
+                                          </p:spTgt>
+                                        </p:tgtEl>
+                                        <p:attrNameLst>
+                                          <p:attrName>style.visibility</p:attrName>
+                                        </p:attrNameLst>
+                                      </p:cBhvr>
+                                      <p:to>
+                                        <p:strVal val="visible"/>
+                                      </p:to>
+                                    </p:set>
+                                  </p:childTnLst>
+                                </p:cTn>
+                              </p:par>
+                            </p:childTnLst>
+                          </p:cTn>
+                        </p:par>
+                      </p:childTnLst>
+                    </p:cTn>
+                  </p:par>
+                  <p:par>
+                    <p:cTn id="23" fill="hold">
+                      <p:stCondLst>
+                        <p:cond delay="indefinite"/>
+                      </p:stCondLst>
+                      <p:childTnLst>
+                        <p:par>
+                          <p:cTn id="24" fill="hold">
+                            <p:stCondLst>
+                              <p:cond delay="0"/>
+                            </p:stCondLst>
+                            <p:childTnLst>
+                              <p:par>
+                                <p:cTn id="25" presetID="1" presetClass="entr" presetSubtype="0" fill="hold" nodeType="clickEffect">
+                                  <p:stCondLst>
+                                    <p:cond delay="0"/>
+                                  </p:stCondLst>
+                                  <p:childTnLst>
+                                    <p:set>
+                                      <p:cBhvr>
+                                        <p:cTn id="26" dur="1" fill="hold">
+                                          <p:stCondLst>
+                                            <p:cond delay="0"/>
+                                          </p:stCondLst>
+                                        </p:cTn>
+                                        <p:tgtEl>
+                                          <p:spTgt spid="9">
+                                            <p:txEl>
+                                              <p:pRg st="0" end="0"/>
+                                            </p:txEl>
+                                          </p:spTgt>
+                                        </p:tgtEl>
+                                        <p:attrNameLst>
+                                          <p:attrName>style.visibility</p:attrName>
+                                        </p:attrNameLst>
+                                      </p:cBhvr>
+                                      <p:to>
+                                        <p:strVal val="visible"/>
+                                      </p:to>
+                                    </p:set>
+                                  </p:childTnLst>
+                                </p:cTn>
+                              </p:par>
+                            </p:childTnLst>
+                          </p:cTn>
+                        </p:par>
+                      </p:childTnLst>
+                    </p:cTn>
+                  </p:par>
+                  <p:par>
+                    <p:cTn id="27" fill="hold">
+                      <p:stCondLst>
+                        <p:cond delay="indefinite"/>
+                      </p:stCondLst>
+                      <p:childTnLst>
+                        <p:par>
+                          <p:cTn id="28" fill="hold">
+                            <p:stCondLst>
+                              <p:cond delay="0"/>
+                            </p:stCondLst>
+                            <p:childTnLst>
+                              <p:par>
+                                <p:cTn id="29" presetID="1" presetClass="entr" presetSubtype="0" fill="hold" nodeType="clickEffect">
+                                  <p:stCondLst>
+                                    <p:cond delay="0"/>
+                                  </p:stCondLst>
+                                  <p:childTnLst>
+                                    <p:set>
+                                      <p:cBhvr>
+                                        <p:cTn id="30" dur="1" fill="hold">
+                                          <p:stCondLst>
+                                            <p:cond delay="0"/>
+                                          </p:stCondLst>
+                                        </p:cTn>
+                                        <p:tgtEl>
+                                          <p:spTgt spid="11">
+                                            <p:txEl>
+                                              <p:pRg st="0" end="0"/>
+                                            </p:txEl>
+                                          </p:spTgt>
+                                        </p:tgtEl>
+                                        <p:attrNameLst>
+                                          <p:attrName>style.visibility</p:attrName>
+                                        </p:attrNameLst>
+                                      </p:cBhvr>
+                                      <p:to>
+                                        <p:strVal val="visible"/>
+                                      </p:to>
+                                    </p:set>
+                                  </p:childTnLst>
+                                </p:cTn>
+                              </p:par>
+                            </p:childTnLst>
+                          </p:cTn>
+                        </p:par>
+                      </p:childTnLst>
+                    </p:cTn>
+                  </p:par>
+                </p:childTnLst>
+              </p:cTn>
+              <p:prevCondLst>
+                <p:cond evt="onPrev" delay="0">
+                  <p:tgtEl>
+                    <p:sldTgt/>
+                  </p:tgtEl>
+                </p:cond>
+              </p:prevCondLst>
+              <p:nextCondLst>
+                <p:cond evt="onNext" delay="0">
+                  <p:tgtEl>
+                    <p:sldTgt/>
+                  </p:tgtEl>
+                </p:cond>
+              </p:nextCondLst>
+            </p:seq>
+          </p:childTnLst>
+        </p:cTn>
+      </p:par>
+    </p:tnLst>
+  </p:timing>
 </p:sld>
 </file>
 

</xml_diff>